<commit_message>
back ground and related works
</commit_message>
<xml_diff>
--- a/Project Presentaion - Group 2- v1.2.0.pptx
+++ b/Project Presentaion - Group 2- v1.2.0.pptx
@@ -21,6 +21,7 @@
     <p:sldId id="268" r:id="rId16"/>
     <p:sldId id="269" r:id="rId17"/>
     <p:sldId id="270" r:id="rId18"/>
+    <p:sldId id="271" r:id="rId19"/>
   </p:sldIdLst>
   <p:sldSz cx="9144000" cy="6858000"/>
   <p:notesSz cx="7772400" cy="10058400"/>
@@ -3023,14 +3024,14 @@
                 <a:spcPct val="100000"/>
               </a:lnSpc>
             </a:pPr>
-            <a:fld id="{75541D4C-E5D2-4996-9C57-0E7C860B606A}" type="datetime">
+            <a:fld id="{6F9AEA72-C141-4495-94D2-DAE4810AE8C0}" type="datetime">
               <a:rPr b="0" lang="en-US" sz="1200" spc="-1" strike="noStrike">
                 <a:solidFill>
                   <a:srgbClr val="8b8b8b"/>
                 </a:solidFill>
                 <a:latin typeface="Calibri"/>
               </a:rPr>
-              <a:t>11/29/20</a:t>
+              <a:t>11/30/20</a:t>
             </a:fld>
             <a:endParaRPr b="0" lang="en-US" sz="1200" spc="-1" strike="noStrike">
               <a:latin typeface="Times New Roman"/>
@@ -3097,7 +3098,7 @@
                 <a:spcPct val="100000"/>
               </a:lnSpc>
             </a:pPr>
-            <a:fld id="{5985F483-EB02-4B18-A477-3C522D566CB2}" type="slidenum">
+            <a:fld id="{D28DD425-A53E-486D-B588-6DBCDC9F5623}" type="slidenum">
               <a:rPr b="0" lang="en-US" sz="1200" spc="-1" strike="noStrike">
                 <a:solidFill>
                   <a:srgbClr val="8b8b8b"/>
@@ -3628,14 +3629,14 @@
                 <a:spcPct val="100000"/>
               </a:lnSpc>
             </a:pPr>
-            <a:fld id="{B12F5006-3F0B-4BDE-BD5B-E26B04061AF1}" type="datetime">
+            <a:fld id="{56037A57-4341-4207-ADB4-5CC6C5D688E5}" type="datetime">
               <a:rPr b="0" lang="en-US" sz="1200" spc="-1" strike="noStrike">
                 <a:solidFill>
                   <a:srgbClr val="8b8b8b"/>
                 </a:solidFill>
                 <a:latin typeface="Calibri"/>
               </a:rPr>
-              <a:t>11/29/20</a:t>
+              <a:t>11/30/20</a:t>
             </a:fld>
             <a:endParaRPr b="0" lang="en-US" sz="1200" spc="-1" strike="noStrike">
               <a:latin typeface="Times New Roman"/>
@@ -3702,7 +3703,7 @@
                 <a:spcPct val="100000"/>
               </a:lnSpc>
             </a:pPr>
-            <a:fld id="{786DA294-1558-43BD-BE00-0D697D7E6E59}" type="slidenum">
+            <a:fld id="{D2940BE0-9C93-448A-BC63-5D9F042D30F2}" type="slidenum">
               <a:rPr b="0" lang="en-US" sz="1200" spc="-1" strike="noStrike">
                 <a:solidFill>
                   <a:srgbClr val="8b8b8b"/>
@@ -4123,8 +4124,8 @@
         </p:nvSpPr>
         <p:spPr>
           <a:xfrm>
-            <a:off x="678240" y="1600200"/>
-            <a:ext cx="3721320" cy="1461960"/>
+            <a:off x="621720" y="4210920"/>
+            <a:ext cx="3777840" cy="1265760"/>
           </a:xfrm>
           <a:prstGeom prst="rect">
             <a:avLst/>
@@ -4141,75 +4142,367 @@
           <a:fontRef idx="minor"/>
         </p:style>
       </p:sp>
-      <p:pic>
-        <p:nvPicPr>
-          <p:cNvPr id="110" name="" descr=""/>
-          <p:cNvPicPr/>
+      <p:sp>
+        <p:nvSpPr>
+          <p:cNvPr id="110" name="CustomShape 3"/>
+          <p:cNvSpPr/>
           <p:nvPr/>
-        </p:nvPicPr>
-        <p:blipFill>
-          <a:blip r:embed="rId2"/>
-          <a:stretch/>
-        </p:blipFill>
-        <p:spPr>
-          <a:xfrm>
-            <a:off x="365760" y="1097280"/>
-            <a:ext cx="4114800" cy="2468880"/>
-          </a:xfrm>
-          <a:prstGeom prst="rect">
-            <a:avLst/>
-          </a:prstGeom>
+        </p:nvSpPr>
+        <p:spPr>
+          <a:xfrm>
+            <a:off x="678240" y="1600200"/>
+            <a:ext cx="3721320" cy="1461960"/>
+          </a:xfrm>
+          <a:prstGeom prst="rect">
+            <a:avLst/>
+          </a:prstGeom>
+          <a:noFill/>
           <a:ln>
             <a:noFill/>
           </a:ln>
         </p:spPr>
-      </p:pic>
-      <p:pic>
-        <p:nvPicPr>
-          <p:cNvPr id="111" name="" descr=""/>
-          <p:cNvPicPr/>
+        <p:style>
+          <a:lnRef idx="0"/>
+          <a:fillRef idx="0"/>
+          <a:effectRef idx="0"/>
+          <a:fontRef idx="minor"/>
+        </p:style>
+      </p:sp>
+      <p:sp>
+        <p:nvSpPr>
+          <p:cNvPr id="111" name="CustomShape 4"/>
+          <p:cNvSpPr/>
           <p:nvPr/>
-        </p:nvPicPr>
-        <p:blipFill>
-          <a:blip r:embed="rId3"/>
-          <a:stretch/>
-        </p:blipFill>
-        <p:spPr>
-          <a:xfrm>
-            <a:off x="4480560" y="1097280"/>
-            <a:ext cx="4352400" cy="2468880"/>
-          </a:xfrm>
-          <a:prstGeom prst="rect">
-            <a:avLst/>
-          </a:prstGeom>
+        </p:nvSpPr>
+        <p:spPr>
+          <a:xfrm>
+            <a:off x="678240" y="1600200"/>
+            <a:ext cx="3710880" cy="2832840"/>
+          </a:xfrm>
+          <a:prstGeom prst="rect">
+            <a:avLst/>
+          </a:prstGeom>
+          <a:noFill/>
           <a:ln>
             <a:noFill/>
           </a:ln>
         </p:spPr>
-      </p:pic>
-      <p:pic>
-        <p:nvPicPr>
-          <p:cNvPr id="112" name="" descr=""/>
-          <p:cNvPicPr/>
+        <p:style>
+          <a:lnRef idx="0"/>
+          <a:fillRef idx="0"/>
+          <a:effectRef idx="0"/>
+          <a:fontRef idx="minor"/>
+        </p:style>
+        <p:txBody>
+          <a:bodyPr lIns="90000" rIns="90000" tIns="45000" bIns="45000">
+            <a:spAutoFit/>
+          </a:bodyPr>
+          <a:p>
+            <a:pPr marL="285840" indent="-285480">
+              <a:lnSpc>
+                <a:spcPct val="100000"/>
+              </a:lnSpc>
+              <a:buClr>
+                <a:srgbClr val="17375e"/>
+              </a:buClr>
+              <a:buFont typeface="Arial"/>
+              <a:buChar char="•"/>
+            </a:pPr>
+            <a:r>
+              <a:rPr b="0" lang="en-US" sz="1800" spc="-1" strike="noStrike">
+                <a:solidFill>
+                  <a:srgbClr val="17375e"/>
+                </a:solidFill>
+                <a:latin typeface="Calibri"/>
+              </a:rPr>
+              <a:t>Model Prediction Accuracy:</a:t>
+            </a:r>
+            <a:endParaRPr b="0" lang="en-US" sz="1800" spc="-1" strike="noStrike">
+              <a:latin typeface="Arial"/>
+            </a:endParaRPr>
+          </a:p>
+          <a:p>
+            <a:pPr lvl="1" marL="432000" indent="-216000">
+              <a:lnSpc>
+                <a:spcPct val="100000"/>
+              </a:lnSpc>
+              <a:buClr>
+                <a:srgbClr val="000000"/>
+              </a:buClr>
+              <a:buSzPct val="45000"/>
+              <a:buFont typeface="Wingdings" charset="2"/>
+              <a:buChar char=""/>
+            </a:pPr>
+            <a:r>
+              <a:rPr b="0" lang="en-US" sz="1800" spc="-1" strike="noStrike">
+                <a:solidFill>
+                  <a:srgbClr val="17375e"/>
+                </a:solidFill>
+                <a:latin typeface="Calibri"/>
+              </a:rPr>
+              <a:t>Race Accuracy of 76%</a:t>
+            </a:r>
+            <a:endParaRPr b="0" lang="en-US" sz="1800" spc="-1" strike="noStrike">
+              <a:latin typeface="Arial"/>
+            </a:endParaRPr>
+          </a:p>
+          <a:p>
+            <a:pPr lvl="2" marL="648000" indent="-216000">
+              <a:lnSpc>
+                <a:spcPct val="100000"/>
+              </a:lnSpc>
+              <a:buClr>
+                <a:srgbClr val="000000"/>
+              </a:buClr>
+              <a:buSzPct val="45000"/>
+              <a:buFont typeface="Wingdings" charset="2"/>
+              <a:buChar char=""/>
+            </a:pPr>
+            <a:r>
+              <a:rPr b="0" lang="en-US" sz="1800" spc="-1" strike="noStrike">
+                <a:solidFill>
+                  <a:srgbClr val="17375e"/>
+                </a:solidFill>
+                <a:latin typeface="Calibri"/>
+              </a:rPr>
+              <a:t>Category 0 ……………..82%</a:t>
+            </a:r>
+            <a:endParaRPr b="0" lang="en-US" sz="1800" spc="-1" strike="noStrike">
+              <a:latin typeface="Arial"/>
+            </a:endParaRPr>
+          </a:p>
+          <a:p>
+            <a:pPr lvl="2" marL="648000" indent="-216000">
+              <a:lnSpc>
+                <a:spcPct val="100000"/>
+              </a:lnSpc>
+              <a:buClr>
+                <a:srgbClr val="000000"/>
+              </a:buClr>
+              <a:buSzPct val="45000"/>
+              <a:buFont typeface="Wingdings" charset="2"/>
+              <a:buChar char=""/>
+            </a:pPr>
+            <a:r>
+              <a:rPr b="0" lang="en-US" sz="1800" spc="-1" strike="noStrike">
+                <a:solidFill>
+                  <a:srgbClr val="17375e"/>
+                </a:solidFill>
+                <a:latin typeface="Calibri"/>
+              </a:rPr>
+              <a:t>Category 1 ……………..81%</a:t>
+            </a:r>
+            <a:endParaRPr b="0" lang="en-US" sz="1800" spc="-1" strike="noStrike">
+              <a:latin typeface="Arial"/>
+            </a:endParaRPr>
+          </a:p>
+          <a:p>
+            <a:pPr lvl="2" marL="648000" indent="-216000">
+              <a:lnSpc>
+                <a:spcPct val="100000"/>
+              </a:lnSpc>
+              <a:buClr>
+                <a:srgbClr val="000000"/>
+              </a:buClr>
+              <a:buSzPct val="45000"/>
+              <a:buFont typeface="Wingdings" charset="2"/>
+              <a:buChar char=""/>
+            </a:pPr>
+            <a:r>
+              <a:rPr b="0" lang="en-US" sz="1800" spc="-1" strike="noStrike">
+                <a:solidFill>
+                  <a:srgbClr val="17375e"/>
+                </a:solidFill>
+                <a:latin typeface="Calibri"/>
+              </a:rPr>
+              <a:t>Category 2 ……………..78%</a:t>
+            </a:r>
+            <a:endParaRPr b="0" lang="en-US" sz="1800" spc="-1" strike="noStrike">
+              <a:latin typeface="Arial"/>
+            </a:endParaRPr>
+          </a:p>
+          <a:p>
+            <a:pPr lvl="2" marL="648000" indent="-216000">
+              <a:lnSpc>
+                <a:spcPct val="100000"/>
+              </a:lnSpc>
+              <a:buClr>
+                <a:srgbClr val="000000"/>
+              </a:buClr>
+              <a:buSzPct val="45000"/>
+              <a:buFont typeface="Wingdings" charset="2"/>
+              <a:buChar char=""/>
+            </a:pPr>
+            <a:r>
+              <a:rPr b="0" lang="en-US" sz="1800" spc="-1" strike="noStrike">
+                <a:solidFill>
+                  <a:srgbClr val="17375e"/>
+                </a:solidFill>
+                <a:latin typeface="Calibri"/>
+              </a:rPr>
+              <a:t>Category 3 ……………..69%</a:t>
+            </a:r>
+            <a:endParaRPr b="0" lang="en-US" sz="1800" spc="-1" strike="noStrike">
+              <a:latin typeface="Arial"/>
+            </a:endParaRPr>
+          </a:p>
+          <a:p>
+            <a:pPr lvl="2" marL="648000" indent="-216000">
+              <a:lnSpc>
+                <a:spcPct val="100000"/>
+              </a:lnSpc>
+              <a:buClr>
+                <a:srgbClr val="000000"/>
+              </a:buClr>
+              <a:buSzPct val="45000"/>
+              <a:buFont typeface="Wingdings" charset="2"/>
+              <a:buChar char=""/>
+            </a:pPr>
+            <a:r>
+              <a:rPr b="0" lang="en-US" sz="1800" spc="-1" strike="noStrike">
+                <a:solidFill>
+                  <a:srgbClr val="17375e"/>
+                </a:solidFill>
+                <a:latin typeface="Calibri"/>
+              </a:rPr>
+              <a:t>Category 4 ……………..11%</a:t>
+            </a:r>
+            <a:endParaRPr b="0" lang="en-US" sz="1800" spc="-1" strike="noStrike">
+              <a:latin typeface="Arial"/>
+            </a:endParaRPr>
+          </a:p>
+          <a:p>
+            <a:pPr lvl="1" marL="432000" indent="-216000">
+              <a:lnSpc>
+                <a:spcPct val="100000"/>
+              </a:lnSpc>
+              <a:buClr>
+                <a:srgbClr val="000000"/>
+              </a:buClr>
+              <a:buSzPct val="45000"/>
+              <a:buFont typeface="Wingdings" charset="2"/>
+              <a:buChar char=""/>
+            </a:pPr>
+            <a:r>
+              <a:rPr b="0" lang="en-US" sz="1800" spc="-1" strike="noStrike">
+                <a:solidFill>
+                  <a:srgbClr val="17375e"/>
+                </a:solidFill>
+                <a:latin typeface="Calibri"/>
+              </a:rPr>
+              <a:t>Gender Accuracy of 89%</a:t>
+            </a:r>
+            <a:endParaRPr b="0" lang="en-US" sz="1800" spc="-1" strike="noStrike">
+              <a:latin typeface="Arial"/>
+            </a:endParaRPr>
+          </a:p>
+          <a:p>
+            <a:pPr lvl="2" marL="648000" indent="-216000">
+              <a:lnSpc>
+                <a:spcPct val="100000"/>
+              </a:lnSpc>
+              <a:buClr>
+                <a:srgbClr val="000000"/>
+              </a:buClr>
+              <a:buSzPct val="45000"/>
+              <a:buFont typeface="Wingdings" charset="2"/>
+              <a:buChar char=""/>
+            </a:pPr>
+            <a:r>
+              <a:rPr b="0" lang="en-US" sz="1800" spc="-1" strike="noStrike">
+                <a:solidFill>
+                  <a:srgbClr val="17375e"/>
+                </a:solidFill>
+                <a:latin typeface="Calibri"/>
+              </a:rPr>
+              <a:t>Male ……………………...89 % </a:t>
+            </a:r>
+            <a:endParaRPr b="0" lang="en-US" sz="1800" spc="-1" strike="noStrike">
+              <a:latin typeface="Arial"/>
+            </a:endParaRPr>
+          </a:p>
+          <a:p>
+            <a:pPr lvl="2" marL="648000" indent="-216000">
+              <a:lnSpc>
+                <a:spcPct val="100000"/>
+              </a:lnSpc>
+              <a:buClr>
+                <a:srgbClr val="000000"/>
+              </a:buClr>
+              <a:buSzPct val="45000"/>
+              <a:buFont typeface="Wingdings" charset="2"/>
+              <a:buChar char=""/>
+            </a:pPr>
+            <a:r>
+              <a:rPr b="0" lang="en-US" sz="1800" spc="-1" strike="noStrike">
+                <a:solidFill>
+                  <a:srgbClr val="17375e"/>
+                </a:solidFill>
+                <a:latin typeface="Calibri"/>
+              </a:rPr>
+              <a:t>Female …………………..88 %</a:t>
+            </a:r>
+            <a:endParaRPr b="0" lang="en-US" sz="1800" spc="-1" strike="noStrike">
+              <a:latin typeface="Arial"/>
+            </a:endParaRPr>
+          </a:p>
+        </p:txBody>
+      </p:sp>
+      <p:sp>
+        <p:nvSpPr>
+          <p:cNvPr id="112" name="CustomShape 5"/>
+          <p:cNvSpPr/>
           <p:nvPr/>
-        </p:nvPicPr>
-        <p:blipFill>
-          <a:blip r:embed="rId4"/>
-          <a:stretch/>
-        </p:blipFill>
-        <p:spPr>
-          <a:xfrm>
-            <a:off x="2286000" y="3566160"/>
-            <a:ext cx="4581000" cy="2286000"/>
-          </a:xfrm>
-          <a:prstGeom prst="rect">
-            <a:avLst/>
-          </a:prstGeom>
+        </p:nvSpPr>
+        <p:spPr>
+          <a:xfrm>
+            <a:off x="4975920" y="1645920"/>
+            <a:ext cx="3710880" cy="364680"/>
+          </a:xfrm>
+          <a:prstGeom prst="rect">
+            <a:avLst/>
+          </a:prstGeom>
+          <a:noFill/>
           <a:ln>
             <a:noFill/>
           </a:ln>
         </p:spPr>
-      </p:pic>
+        <p:style>
+          <a:lnRef idx="0"/>
+          <a:fillRef idx="0"/>
+          <a:effectRef idx="0"/>
+          <a:fontRef idx="minor"/>
+        </p:style>
+        <p:txBody>
+          <a:bodyPr lIns="90000" rIns="90000" tIns="45000" bIns="45000">
+            <a:spAutoFit/>
+          </a:bodyPr>
+          <a:p>
+            <a:pPr marL="285840" indent="-285480">
+              <a:lnSpc>
+                <a:spcPct val="100000"/>
+              </a:lnSpc>
+              <a:buClr>
+                <a:srgbClr val="17375e"/>
+              </a:buClr>
+              <a:buFont typeface="Arial"/>
+              <a:buChar char="•"/>
+            </a:pPr>
+            <a:r>
+              <a:rPr b="0" lang="en-US" sz="1800" spc="-1" strike="noStrike">
+                <a:solidFill>
+                  <a:srgbClr val="17375e"/>
+                </a:solidFill>
+                <a:latin typeface="Calibri"/>
+              </a:rPr>
+              <a:t>Stats for Age Model</a:t>
+            </a:r>
+            <a:endParaRPr b="0" lang="en-US" sz="1800" spc="-1" strike="noStrike">
+              <a:latin typeface="Arial"/>
+            </a:endParaRPr>
+          </a:p>
+        </p:txBody>
+      </p:sp>
     </p:spTree>
   </p:cSld>
   <mc:AlternateContent>
@@ -4292,7 +4585,7 @@
                 </a:solidFill>
                 <a:latin typeface="Calibri"/>
               </a:rPr>
-              <a:t>Discussions</a:t>
+              <a:t>Results</a:t>
             </a:r>
             <a:endParaRPr b="0" lang="en-US" sz="4400" spc="-1" strike="noStrike">
               <a:latin typeface="Arial"/>
@@ -4308,8 +4601,8 @@
         </p:nvSpPr>
         <p:spPr>
           <a:xfrm>
-            <a:off x="621720" y="4210920"/>
-            <a:ext cx="3777840" cy="1265760"/>
+            <a:off x="678240" y="1600200"/>
+            <a:ext cx="3721320" cy="1461960"/>
           </a:xfrm>
           <a:prstGeom prst="rect">
             <a:avLst/>
@@ -4326,32 +4619,75 @@
           <a:fontRef idx="minor"/>
         </p:style>
       </p:sp>
-      <p:sp>
-        <p:nvSpPr>
-          <p:cNvPr id="115" name="CustomShape 3"/>
-          <p:cNvSpPr/>
+      <p:pic>
+        <p:nvPicPr>
+          <p:cNvPr id="115" name="" descr=""/>
+          <p:cNvPicPr/>
           <p:nvPr/>
-        </p:nvSpPr>
-        <p:spPr>
-          <a:xfrm>
-            <a:off x="678240" y="1600200"/>
-            <a:ext cx="3721320" cy="1461960"/>
-          </a:xfrm>
-          <a:prstGeom prst="rect">
-            <a:avLst/>
-          </a:prstGeom>
-          <a:noFill/>
+        </p:nvPicPr>
+        <p:blipFill>
+          <a:blip r:embed="rId2"/>
+          <a:stretch/>
+        </p:blipFill>
+        <p:spPr>
+          <a:xfrm>
+            <a:off x="365760" y="1097280"/>
+            <a:ext cx="4114800" cy="2468880"/>
+          </a:xfrm>
+          <a:prstGeom prst="rect">
+            <a:avLst/>
+          </a:prstGeom>
           <a:ln>
             <a:noFill/>
           </a:ln>
         </p:spPr>
-        <p:style>
-          <a:lnRef idx="0"/>
-          <a:fillRef idx="0"/>
-          <a:effectRef idx="0"/>
-          <a:fontRef idx="minor"/>
-        </p:style>
-      </p:sp>
+      </p:pic>
+      <p:pic>
+        <p:nvPicPr>
+          <p:cNvPr id="116" name="" descr=""/>
+          <p:cNvPicPr/>
+          <p:nvPr/>
+        </p:nvPicPr>
+        <p:blipFill>
+          <a:blip r:embed="rId3"/>
+          <a:stretch/>
+        </p:blipFill>
+        <p:spPr>
+          <a:xfrm>
+            <a:off x="4480560" y="1097280"/>
+            <a:ext cx="4352400" cy="2468880"/>
+          </a:xfrm>
+          <a:prstGeom prst="rect">
+            <a:avLst/>
+          </a:prstGeom>
+          <a:ln>
+            <a:noFill/>
+          </a:ln>
+        </p:spPr>
+      </p:pic>
+      <p:pic>
+        <p:nvPicPr>
+          <p:cNvPr id="117" name="" descr=""/>
+          <p:cNvPicPr/>
+          <p:nvPr/>
+        </p:nvPicPr>
+        <p:blipFill>
+          <a:blip r:embed="rId4"/>
+          <a:stretch/>
+        </p:blipFill>
+        <p:spPr>
+          <a:xfrm>
+            <a:off x="2286000" y="3566160"/>
+            <a:ext cx="4581000" cy="2286000"/>
+          </a:xfrm>
+          <a:prstGeom prst="rect">
+            <a:avLst/>
+          </a:prstGeom>
+          <a:ln>
+            <a:noFill/>
+          </a:ln>
+        </p:spPr>
+      </p:pic>
     </p:spTree>
   </p:cSld>
   <mc:AlternateContent>
@@ -4394,7 +4730,7 @@
       </p:grpSpPr>
       <p:sp>
         <p:nvSpPr>
-          <p:cNvPr id="116" name="CustomShape 1"/>
+          <p:cNvPr id="118" name="CustomShape 1"/>
           <p:cNvSpPr/>
           <p:nvPr/>
         </p:nvSpPr>
@@ -4434,7 +4770,7 @@
                 </a:solidFill>
                 <a:latin typeface="Calibri"/>
               </a:rPr>
-              <a:t>Conclusions</a:t>
+              <a:t>Discussions</a:t>
             </a:r>
             <a:endParaRPr b="0" lang="en-US" sz="4400" spc="-1" strike="noStrike">
               <a:latin typeface="Arial"/>
@@ -4444,7 +4780,7 @@
       </p:sp>
       <p:sp>
         <p:nvSpPr>
-          <p:cNvPr id="117" name="CustomShape 2"/>
+          <p:cNvPr id="119" name="CustomShape 2"/>
           <p:cNvSpPr/>
           <p:nvPr/>
         </p:nvSpPr>
@@ -4470,7 +4806,7 @@
       </p:sp>
       <p:sp>
         <p:nvSpPr>
-          <p:cNvPr id="118" name="CustomShape 3"/>
+          <p:cNvPr id="120" name="CustomShape 3"/>
           <p:cNvSpPr/>
           <p:nvPr/>
         </p:nvSpPr>
@@ -4536,7 +4872,7 @@
       </p:grpSpPr>
       <p:sp>
         <p:nvSpPr>
-          <p:cNvPr id="119" name="CustomShape 1"/>
+          <p:cNvPr id="121" name="CustomShape 1"/>
           <p:cNvSpPr/>
           <p:nvPr/>
         </p:nvSpPr>
@@ -4576,7 +4912,7 @@
                 </a:solidFill>
                 <a:latin typeface="Calibri"/>
               </a:rPr>
-              <a:t>Future Outlook</a:t>
+              <a:t>Conclusions</a:t>
             </a:r>
             <a:endParaRPr b="0" lang="en-US" sz="4400" spc="-1" strike="noStrike">
               <a:latin typeface="Arial"/>
@@ -4586,7 +4922,7 @@
       </p:sp>
       <p:sp>
         <p:nvSpPr>
-          <p:cNvPr id="120" name="CustomShape 2"/>
+          <p:cNvPr id="122" name="CustomShape 2"/>
           <p:cNvSpPr/>
           <p:nvPr/>
         </p:nvSpPr>
@@ -4612,7 +4948,7 @@
       </p:sp>
       <p:sp>
         <p:nvSpPr>
-          <p:cNvPr id="121" name="CustomShape 3"/>
+          <p:cNvPr id="123" name="CustomShape 3"/>
           <p:cNvSpPr/>
           <p:nvPr/>
         </p:nvSpPr>
@@ -4678,14 +5014,14 @@
       </p:grpSpPr>
       <p:sp>
         <p:nvSpPr>
-          <p:cNvPr id="122" name="TextShape 1"/>
-          <p:cNvSpPr txBox="1"/>
+          <p:cNvPr id="124" name="CustomShape 1"/>
+          <p:cNvSpPr/>
           <p:nvPr/>
         </p:nvSpPr>
         <p:spPr>
           <a:xfrm>
-            <a:off x="2747880" y="1853280"/>
-            <a:ext cx="4749840" cy="2044800"/>
+            <a:off x="457200" y="186840"/>
+            <a:ext cx="8228880" cy="1142280"/>
           </a:xfrm>
           <a:prstGeom prst="rect">
             <a:avLst/>
@@ -4695,33 +5031,88 @@
             <a:noFill/>
           </a:ln>
         </p:spPr>
-        <p:txBody>
-          <a:bodyPr anchor="ctr">
+        <p:style>
+          <a:lnRef idx="0"/>
+          <a:fillRef idx="0"/>
+          <a:effectRef idx="0"/>
+          <a:fontRef idx="minor"/>
+        </p:style>
+        <p:txBody>
+          <a:bodyPr lIns="90000" rIns="90000" tIns="45000" bIns="45000" anchor="ctr">
             <a:noAutofit/>
           </a:bodyPr>
           <a:p>
-            <a:pPr>
-              <a:lnSpc>
-                <a:spcPct val="100000"/>
-              </a:lnSpc>
-            </a:pPr>
-            <a:r>
-              <a:rPr b="0" lang="en-US" sz="8000" spc="-1" strike="noStrike">
-                <a:solidFill>
-                  <a:srgbClr val="1f497d"/>
-                </a:solidFill>
-                <a:latin typeface="Arial"/>
-              </a:rPr>
-              <a:t>Q &amp; A </a:t>
-            </a:r>
-            <a:endParaRPr b="0" lang="en-US" sz="8000" spc="-1" strike="noStrike">
-              <a:solidFill>
-                <a:srgbClr val="000000"/>
-              </a:solidFill>
-              <a:latin typeface="Calibri"/>
-            </a:endParaRPr>
-          </a:p>
-        </p:txBody>
+            <a:pPr algn="ctr">
+              <a:lnSpc>
+                <a:spcPct val="100000"/>
+              </a:lnSpc>
+            </a:pPr>
+            <a:r>
+              <a:rPr b="0" lang="en-US" sz="4400" spc="-1" strike="noStrike">
+                <a:solidFill>
+                  <a:srgbClr val="17375e"/>
+                </a:solidFill>
+                <a:latin typeface="Calibri"/>
+              </a:rPr>
+              <a:t>Future Outlook</a:t>
+            </a:r>
+            <a:endParaRPr b="0" lang="en-US" sz="4400" spc="-1" strike="noStrike">
+              <a:latin typeface="Arial"/>
+            </a:endParaRPr>
+          </a:p>
+        </p:txBody>
+      </p:sp>
+      <p:sp>
+        <p:nvSpPr>
+          <p:cNvPr id="125" name="CustomShape 2"/>
+          <p:cNvSpPr/>
+          <p:nvPr/>
+        </p:nvSpPr>
+        <p:spPr>
+          <a:xfrm>
+            <a:off x="621720" y="4210920"/>
+            <a:ext cx="3777840" cy="1265760"/>
+          </a:xfrm>
+          <a:prstGeom prst="rect">
+            <a:avLst/>
+          </a:prstGeom>
+          <a:noFill/>
+          <a:ln>
+            <a:noFill/>
+          </a:ln>
+        </p:spPr>
+        <p:style>
+          <a:lnRef idx="0"/>
+          <a:fillRef idx="0"/>
+          <a:effectRef idx="0"/>
+          <a:fontRef idx="minor"/>
+        </p:style>
+      </p:sp>
+      <p:sp>
+        <p:nvSpPr>
+          <p:cNvPr id="126" name="CustomShape 3"/>
+          <p:cNvSpPr/>
+          <p:nvPr/>
+        </p:nvSpPr>
+        <p:spPr>
+          <a:xfrm>
+            <a:off x="678240" y="1600200"/>
+            <a:ext cx="3721320" cy="1461960"/>
+          </a:xfrm>
+          <a:prstGeom prst="rect">
+            <a:avLst/>
+          </a:prstGeom>
+          <a:noFill/>
+          <a:ln>
+            <a:noFill/>
+          </a:ln>
+        </p:spPr>
+        <p:style>
+          <a:lnRef idx="0"/>
+          <a:fillRef idx="0"/>
+          <a:effectRef idx="0"/>
+          <a:fontRef idx="minor"/>
+        </p:style>
       </p:sp>
     </p:spTree>
   </p:cSld>
@@ -4765,7 +5156,94 @@
       </p:grpSpPr>
       <p:sp>
         <p:nvSpPr>
-          <p:cNvPr id="123" name="TextShape 1"/>
+          <p:cNvPr id="127" name="TextShape 1"/>
+          <p:cNvSpPr txBox="1"/>
+          <p:nvPr/>
+        </p:nvSpPr>
+        <p:spPr>
+          <a:xfrm>
+            <a:off x="2747880" y="1853280"/>
+            <a:ext cx="4749840" cy="2044800"/>
+          </a:xfrm>
+          <a:prstGeom prst="rect">
+            <a:avLst/>
+          </a:prstGeom>
+          <a:noFill/>
+          <a:ln>
+            <a:noFill/>
+          </a:ln>
+        </p:spPr>
+        <p:txBody>
+          <a:bodyPr anchor="ctr">
+            <a:noAutofit/>
+          </a:bodyPr>
+          <a:p>
+            <a:pPr>
+              <a:lnSpc>
+                <a:spcPct val="100000"/>
+              </a:lnSpc>
+            </a:pPr>
+            <a:r>
+              <a:rPr b="0" lang="en-US" sz="8000" spc="-1" strike="noStrike">
+                <a:solidFill>
+                  <a:srgbClr val="1f497d"/>
+                </a:solidFill>
+                <a:latin typeface="Arial"/>
+              </a:rPr>
+              <a:t>Q &amp; A </a:t>
+            </a:r>
+            <a:endParaRPr b="0" lang="en-US" sz="8000" spc="-1" strike="noStrike">
+              <a:solidFill>
+                <a:srgbClr val="000000"/>
+              </a:solidFill>
+              <a:latin typeface="Calibri"/>
+            </a:endParaRPr>
+          </a:p>
+        </p:txBody>
+      </p:sp>
+    </p:spTree>
+  </p:cSld>
+  <mc:AlternateContent>
+    <mc:Choice Requires="p14">
+      <p:transition spd="slow" p14:dur="2000"/>
+    </mc:Choice>
+    <mc:Fallback>
+      <p:transition spd="slow"/>
+    </mc:Fallback>
+  </mc:AlternateContent>
+</p:sld>
+</file>
+
+<file path=ppt/slides/slide16.xml><?xml version="1.0" encoding="utf-8"?>
+<p:sld xmlns:a="http://schemas.openxmlformats.org/drawingml/2006/main" xmlns:p="http://schemas.openxmlformats.org/presentationml/2006/main" xmlns:r="http://schemas.openxmlformats.org/officeDocument/2006/relationships" xmlns:p14="http://schemas.microsoft.com/office/powerpoint/2010/main" xmlns:p15="http://schemas.microsoft.com/office/powerpoint/2012/main" xmlns:mc="http://schemas.openxmlformats.org/markup-compatibility/2006">
+  <p:cSld>
+    <p:bg>
+      <p:bgPr>
+        <a:blipFill rotWithShape="0">
+          <a:blip r:embed="rId1"/>
+          <a:stretch>
+            <a:fillRect/>
+          </a:stretch>
+        </a:blipFill>
+      </p:bgPr>
+    </p:bg>
+    <p:spTree>
+      <p:nvGrpSpPr>
+        <p:cNvPr id="1" name=""/>
+        <p:cNvGrpSpPr/>
+        <p:nvPr/>
+      </p:nvGrpSpPr>
+      <p:grpSpPr>
+        <a:xfrm>
+          <a:off x="0" y="0"/>
+          <a:ext cx="0" cy="0"/>
+          <a:chOff x="0" y="0"/>
+          <a:chExt cx="0" cy="0"/>
+        </a:xfrm>
+      </p:grpSpPr>
+      <p:sp>
+        <p:nvSpPr>
+          <p:cNvPr id="128" name="TextShape 1"/>
           <p:cNvSpPr txBox="1"/>
           <p:nvPr/>
         </p:nvSpPr>
@@ -5667,6 +6145,139 @@
           </a:p>
         </p:txBody>
       </p:sp>
+      <p:sp>
+        <p:nvSpPr>
+          <p:cNvPr id="93" name="CustomShape 3"/>
+          <p:cNvSpPr/>
+          <p:nvPr/>
+        </p:nvSpPr>
+        <p:spPr>
+          <a:xfrm>
+            <a:off x="678240" y="1600200"/>
+            <a:ext cx="7368480" cy="2010600"/>
+          </a:xfrm>
+          <a:prstGeom prst="rect">
+            <a:avLst/>
+          </a:prstGeom>
+          <a:noFill/>
+          <a:ln>
+            <a:noFill/>
+          </a:ln>
+        </p:spPr>
+        <p:style>
+          <a:lnRef idx="0"/>
+          <a:fillRef idx="0"/>
+          <a:effectRef idx="0"/>
+          <a:fontRef idx="minor"/>
+        </p:style>
+        <p:txBody>
+          <a:bodyPr lIns="90000" rIns="90000" tIns="45000" bIns="45000">
+            <a:spAutoFit/>
+          </a:bodyPr>
+          <a:p>
+            <a:pPr marL="285840" indent="-285480">
+              <a:lnSpc>
+                <a:spcPct val="100000"/>
+              </a:lnSpc>
+              <a:buClr>
+                <a:srgbClr val="17375e"/>
+              </a:buClr>
+              <a:buFont typeface="Arial"/>
+              <a:buChar char="•"/>
+            </a:pPr>
+            <a:r>
+              <a:rPr b="0" lang="en-US" sz="1800" spc="-1" strike="noStrike">
+                <a:solidFill>
+                  <a:srgbClr val="17375e"/>
+                </a:solidFill>
+                <a:latin typeface="Calibri"/>
+              </a:rPr>
+              <a:t>The structure of a CNN architecture is divided into multiple learning stages composed of convolutional layers, non-linear processing units, and subsampling layers</a:t>
+            </a:r>
+            <a:endParaRPr b="0" lang="en-US" sz="1800" spc="-1" strike="noStrike">
+              <a:latin typeface="Arial"/>
+            </a:endParaRPr>
+          </a:p>
+          <a:p>
+            <a:pPr marL="285840" indent="-285480">
+              <a:lnSpc>
+                <a:spcPct val="100000"/>
+              </a:lnSpc>
+              <a:buClr>
+                <a:srgbClr val="17375e"/>
+              </a:buClr>
+              <a:buFont typeface="Arial"/>
+              <a:buChar char="•"/>
+            </a:pPr>
+            <a:endParaRPr b="0" lang="en-US" sz="1800" spc="-1" strike="noStrike">
+              <a:latin typeface="Arial"/>
+            </a:endParaRPr>
+          </a:p>
+          <a:p>
+            <a:pPr marL="285840" indent="-285480">
+              <a:lnSpc>
+                <a:spcPct val="100000"/>
+              </a:lnSpc>
+              <a:buClr>
+                <a:srgbClr val="17375e"/>
+              </a:buClr>
+              <a:buFont typeface="Arial"/>
+              <a:buChar char="•"/>
+            </a:pPr>
+            <a:r>
+              <a:rPr b="0" lang="en-US" sz="1800" spc="-1" strike="noStrike">
+                <a:solidFill>
+                  <a:srgbClr val="17375e"/>
+                </a:solidFill>
+                <a:latin typeface="Calibri"/>
+              </a:rPr>
+              <a:t>tbd</a:t>
+            </a:r>
+            <a:endParaRPr b="0" lang="en-US" sz="1800" spc="-1" strike="noStrike">
+              <a:latin typeface="Arial"/>
+            </a:endParaRPr>
+          </a:p>
+          <a:p>
+            <a:pPr marL="285840" indent="-285480">
+              <a:lnSpc>
+                <a:spcPct val="100000"/>
+              </a:lnSpc>
+              <a:buClr>
+                <a:srgbClr val="17375e"/>
+              </a:buClr>
+              <a:buFont typeface="Arial"/>
+              <a:buChar char="•"/>
+            </a:pPr>
+            <a:endParaRPr b="0" lang="en-US" sz="1800" spc="-1" strike="noStrike">
+              <a:latin typeface="Arial"/>
+            </a:endParaRPr>
+          </a:p>
+          <a:p>
+            <a:pPr marL="285840" indent="-285480">
+              <a:lnSpc>
+                <a:spcPct val="100000"/>
+              </a:lnSpc>
+              <a:buClr>
+                <a:srgbClr val="17375e"/>
+              </a:buClr>
+              <a:buFont typeface="Arial"/>
+              <a:buChar char="•"/>
+            </a:pPr>
+            <a:r>
+              <a:rPr b="0" lang="en-US" sz="1800" spc="-1" strike="noStrike">
+                <a:solidFill>
+                  <a:srgbClr val="17375e"/>
+                </a:solidFill>
+                <a:latin typeface="Calibri"/>
+              </a:rPr>
+              <a:t>tbd</a:t>
+            </a:r>
+            <a:endParaRPr b="0" lang="en-US" sz="1800" spc="-1" strike="noStrike">
+              <a:latin typeface="Arial"/>
+            </a:endParaRPr>
+          </a:p>
+        </p:txBody>
+      </p:sp>
     </p:spTree>
   </p:cSld>
   <mc:AlternateContent>
@@ -5709,13 +6320,13 @@
       </p:grpSpPr>
       <p:sp>
         <p:nvSpPr>
-          <p:cNvPr id="93" name="CustomShape 1"/>
+          <p:cNvPr id="94" name="CustomShape 1"/>
           <p:cNvSpPr/>
           <p:nvPr/>
         </p:nvSpPr>
         <p:spPr>
           <a:xfrm>
-            <a:off x="457200" y="274680"/>
+            <a:off x="457200" y="257400"/>
             <a:ext cx="8228880" cy="1142280"/>
           </a:xfrm>
           <a:prstGeom prst="rect">
@@ -5749,7 +6360,7 @@
                 </a:solidFill>
                 <a:latin typeface="Calibri"/>
               </a:rPr>
-              <a:t>Architecture and Methodology</a:t>
+              <a:t>Background and Related Works </a:t>
             </a:r>
             <a:endParaRPr b="0" lang="en-US" sz="4400" spc="-1" strike="noStrike">
               <a:latin typeface="Arial"/>
@@ -5759,14 +6370,14 @@
       </p:sp>
       <p:sp>
         <p:nvSpPr>
-          <p:cNvPr id="94" name="CustomShape 2"/>
+          <p:cNvPr id="95" name="CustomShape 2"/>
           <p:cNvSpPr/>
           <p:nvPr/>
         </p:nvSpPr>
         <p:spPr>
           <a:xfrm>
             <a:off x="731520" y="1667520"/>
-            <a:ext cx="3911040" cy="913320"/>
+            <a:ext cx="7880760" cy="669600"/>
           </a:xfrm>
           <a:prstGeom prst="rect">
             <a:avLst/>
@@ -5787,25 +6398,11 @@
             <a:spAutoFit/>
           </a:bodyPr>
           <a:p>
-            <a:pPr marL="285840" indent="-285480">
-              <a:lnSpc>
-                <a:spcPct val="100000"/>
-              </a:lnSpc>
-              <a:buClr>
-                <a:srgbClr val="17375e"/>
-              </a:buClr>
-              <a:buFont typeface="Arial"/>
-              <a:buChar char="•"/>
-            </a:pPr>
-            <a:r>
-              <a:rPr b="0" lang="en-US" sz="1800" spc="-1" strike="noStrike">
-                <a:solidFill>
-                  <a:srgbClr val="17375e"/>
-                </a:solidFill>
-                <a:latin typeface="Calibri"/>
-              </a:rPr>
-              <a:t> </a:t>
-            </a:r>
+            <a:pPr>
+              <a:lnSpc>
+                <a:spcPct val="100000"/>
+              </a:lnSpc>
+            </a:pPr>
             <a:endParaRPr b="0" lang="en-US" sz="1800" spc="-1" strike="noStrike">
               <a:latin typeface="Arial"/>
             </a:endParaRPr>
@@ -5820,18 +6417,31 @@
               <a:latin typeface="Arial"/>
             </a:endParaRPr>
           </a:p>
-          <a:p>
-            <a:pPr>
-              <a:lnSpc>
-                <a:spcPct val="100000"/>
-              </a:lnSpc>
-            </a:pPr>
-            <a:endParaRPr b="0" lang="en-US" sz="1800" spc="-1" strike="noStrike">
-              <a:latin typeface="Arial"/>
-            </a:endParaRPr>
-          </a:p>
-        </p:txBody>
-      </p:sp>
+        </p:txBody>
+      </p:sp>
+      <p:pic>
+        <p:nvPicPr>
+          <p:cNvPr id="96" name="" descr=""/>
+          <p:cNvPicPr/>
+          <p:nvPr/>
+        </p:nvPicPr>
+        <p:blipFill>
+          <a:blip r:embed="rId2"/>
+          <a:stretch/>
+        </p:blipFill>
+        <p:spPr>
+          <a:xfrm>
+            <a:off x="1491840" y="1554480"/>
+            <a:ext cx="6201000" cy="4114800"/>
+          </a:xfrm>
+          <a:prstGeom prst="rect">
+            <a:avLst/>
+          </a:prstGeom>
+          <a:ln>
+            <a:noFill/>
+          </a:ln>
+        </p:spPr>
+      </p:pic>
     </p:spTree>
   </p:cSld>
   <mc:AlternateContent>
@@ -5874,7 +6484,7 @@
       </p:grpSpPr>
       <p:sp>
         <p:nvSpPr>
-          <p:cNvPr id="95" name="CustomShape 1"/>
+          <p:cNvPr id="97" name="CustomShape 1"/>
           <p:cNvSpPr/>
           <p:nvPr/>
         </p:nvSpPr>
@@ -5914,7 +6524,7 @@
                 </a:solidFill>
                 <a:latin typeface="Calibri"/>
               </a:rPr>
-              <a:t>Unified Model</a:t>
+              <a:t>Architecture and Methodology</a:t>
             </a:r>
             <a:endParaRPr b="0" lang="en-US" sz="4400" spc="-1" strike="noStrike">
               <a:latin typeface="Arial"/>
@@ -5922,9 +6532,84 @@
           </a:p>
         </p:txBody>
       </p:sp>
+      <p:sp>
+        <p:nvSpPr>
+          <p:cNvPr id="98" name="CustomShape 2"/>
+          <p:cNvSpPr/>
+          <p:nvPr/>
+        </p:nvSpPr>
+        <p:spPr>
+          <a:xfrm>
+            <a:off x="731520" y="1667520"/>
+            <a:ext cx="3911040" cy="913320"/>
+          </a:xfrm>
+          <a:prstGeom prst="rect">
+            <a:avLst/>
+          </a:prstGeom>
+          <a:noFill/>
+          <a:ln>
+            <a:noFill/>
+          </a:ln>
+        </p:spPr>
+        <p:style>
+          <a:lnRef idx="0"/>
+          <a:fillRef idx="0"/>
+          <a:effectRef idx="0"/>
+          <a:fontRef idx="minor"/>
+        </p:style>
+        <p:txBody>
+          <a:bodyPr lIns="90000" rIns="90000" tIns="45000" bIns="45000">
+            <a:spAutoFit/>
+          </a:bodyPr>
+          <a:p>
+            <a:pPr marL="285840" indent="-285480">
+              <a:lnSpc>
+                <a:spcPct val="100000"/>
+              </a:lnSpc>
+              <a:buClr>
+                <a:srgbClr val="17375e"/>
+              </a:buClr>
+              <a:buFont typeface="Arial"/>
+              <a:buChar char="•"/>
+            </a:pPr>
+            <a:r>
+              <a:rPr b="0" lang="en-US" sz="1800" spc="-1" strike="noStrike">
+                <a:solidFill>
+                  <a:srgbClr val="17375e"/>
+                </a:solidFill>
+                <a:latin typeface="Calibri"/>
+              </a:rPr>
+              <a:t> </a:t>
+            </a:r>
+            <a:endParaRPr b="0" lang="en-US" sz="1800" spc="-1" strike="noStrike">
+              <a:latin typeface="Arial"/>
+            </a:endParaRPr>
+          </a:p>
+          <a:p>
+            <a:pPr>
+              <a:lnSpc>
+                <a:spcPct val="100000"/>
+              </a:lnSpc>
+            </a:pPr>
+            <a:endParaRPr b="0" lang="en-US" sz="1800" spc="-1" strike="noStrike">
+              <a:latin typeface="Arial"/>
+            </a:endParaRPr>
+          </a:p>
+          <a:p>
+            <a:pPr>
+              <a:lnSpc>
+                <a:spcPct val="100000"/>
+              </a:lnSpc>
+            </a:pPr>
+            <a:endParaRPr b="0" lang="en-US" sz="1800" spc="-1" strike="noStrike">
+              <a:latin typeface="Arial"/>
+            </a:endParaRPr>
+          </a:p>
+        </p:txBody>
+      </p:sp>
       <p:pic>
         <p:nvPicPr>
-          <p:cNvPr id="96" name="" descr=""/>
+          <p:cNvPr id="99" name="" descr=""/>
           <p:cNvPicPr/>
           <p:nvPr/>
         </p:nvPicPr>
@@ -5934,8 +6619,8 @@
         </p:blipFill>
         <p:spPr>
           <a:xfrm>
-            <a:off x="886680" y="1188720"/>
-            <a:ext cx="7342920" cy="4572000"/>
+            <a:off x="2990520" y="1241280"/>
+            <a:ext cx="3204000" cy="4388760"/>
           </a:xfrm>
           <a:prstGeom prst="rect">
             <a:avLst/>
@@ -5987,13 +6672,13 @@
       </p:grpSpPr>
       <p:sp>
         <p:nvSpPr>
-          <p:cNvPr id="97" name="CustomShape 1"/>
+          <p:cNvPr id="100" name="CustomShape 1"/>
           <p:cNvSpPr/>
           <p:nvPr/>
         </p:nvSpPr>
         <p:spPr>
           <a:xfrm>
-            <a:off x="457200" y="186840"/>
+            <a:off x="457200" y="274680"/>
             <a:ext cx="8228880" cy="1142280"/>
           </a:xfrm>
           <a:prstGeom prst="rect">
@@ -6027,7 +6712,7 @@
                 </a:solidFill>
                 <a:latin typeface="Calibri"/>
               </a:rPr>
-              <a:t>Data</a:t>
+              <a:t>Unified Model</a:t>
             </a:r>
             <a:endParaRPr b="0" lang="en-US" sz="4400" spc="-1" strike="noStrike">
               <a:latin typeface="Arial"/>
@@ -6035,277 +6720,29 @@
           </a:p>
         </p:txBody>
       </p:sp>
-      <p:sp>
-        <p:nvSpPr>
-          <p:cNvPr id="98" name="CustomShape 2"/>
-          <p:cNvSpPr/>
+      <p:pic>
+        <p:nvPicPr>
+          <p:cNvPr id="101" name="" descr=""/>
+          <p:cNvPicPr/>
           <p:nvPr/>
-        </p:nvSpPr>
-        <p:spPr>
-          <a:xfrm>
-            <a:off x="621720" y="4210920"/>
-            <a:ext cx="3777840" cy="1265760"/>
-          </a:xfrm>
-          <a:prstGeom prst="rect">
-            <a:avLst/>
-          </a:prstGeom>
-          <a:noFill/>
+        </p:nvPicPr>
+        <p:blipFill>
+          <a:blip r:embed="rId2"/>
+          <a:stretch/>
+        </p:blipFill>
+        <p:spPr>
+          <a:xfrm>
+            <a:off x="886680" y="1188720"/>
+            <a:ext cx="7342920" cy="4572000"/>
+          </a:xfrm>
+          <a:prstGeom prst="rect">
+            <a:avLst/>
+          </a:prstGeom>
           <a:ln>
             <a:noFill/>
           </a:ln>
         </p:spPr>
-        <p:style>
-          <a:lnRef idx="0"/>
-          <a:fillRef idx="0"/>
-          <a:effectRef idx="0"/>
-          <a:fontRef idx="minor"/>
-        </p:style>
-      </p:sp>
-      <p:sp>
-        <p:nvSpPr>
-          <p:cNvPr id="99" name="CustomShape 3"/>
-          <p:cNvSpPr/>
-          <p:nvPr/>
-        </p:nvSpPr>
-        <p:spPr>
-          <a:xfrm>
-            <a:off x="678240" y="1600200"/>
-            <a:ext cx="7002720" cy="2558520"/>
-          </a:xfrm>
-          <a:prstGeom prst="rect">
-            <a:avLst/>
-          </a:prstGeom>
-          <a:noFill/>
-          <a:ln>
-            <a:noFill/>
-          </a:ln>
-        </p:spPr>
-        <p:style>
-          <a:lnRef idx="0"/>
-          <a:fillRef idx="0"/>
-          <a:effectRef idx="0"/>
-          <a:fontRef idx="minor"/>
-        </p:style>
-        <p:txBody>
-          <a:bodyPr lIns="90000" rIns="90000" tIns="45000" bIns="45000">
-            <a:spAutoFit/>
-          </a:bodyPr>
-          <a:p>
-            <a:pPr marL="285840" indent="-285480">
-              <a:lnSpc>
-                <a:spcPct val="100000"/>
-              </a:lnSpc>
-              <a:buClr>
-                <a:srgbClr val="17375e"/>
-              </a:buClr>
-              <a:buFont typeface="Arial"/>
-              <a:buChar char="•"/>
-            </a:pPr>
-            <a:r>
-              <a:rPr b="0" lang="en-US" sz="1800" spc="-1" strike="noStrike">
-                <a:solidFill>
-                  <a:srgbClr val="17375e"/>
-                </a:solidFill>
-                <a:latin typeface="Calibri"/>
-              </a:rPr>
-              <a:t>23705 Facial Images</a:t>
-            </a:r>
-            <a:endParaRPr b="0" lang="en-US" sz="1800" spc="-1" strike="noStrike">
-              <a:latin typeface="Arial"/>
-            </a:endParaRPr>
-          </a:p>
-          <a:p>
-            <a:pPr lvl="1" marL="432000" indent="-216000">
-              <a:lnSpc>
-                <a:spcPct val="100000"/>
-              </a:lnSpc>
-              <a:buClr>
-                <a:srgbClr val="000000"/>
-              </a:buClr>
-              <a:buSzPct val="45000"/>
-              <a:buFont typeface="Wingdings" charset="2"/>
-              <a:buChar char=""/>
-            </a:pPr>
-            <a:r>
-              <a:rPr b="0" lang="en-US" sz="1800" spc="-1" strike="noStrike">
-                <a:solidFill>
-                  <a:srgbClr val="17375e"/>
-                </a:solidFill>
-                <a:latin typeface="Calibri"/>
-              </a:rPr>
-              <a:t>Image Size is 48 x 48 pixels </a:t>
-            </a:r>
-            <a:endParaRPr b="0" lang="en-US" sz="1800" spc="-1" strike="noStrike">
-              <a:latin typeface="Arial"/>
-            </a:endParaRPr>
-          </a:p>
-          <a:p>
-            <a:pPr lvl="1" marL="432000" indent="-216000">
-              <a:lnSpc>
-                <a:spcPct val="100000"/>
-              </a:lnSpc>
-              <a:buClr>
-                <a:srgbClr val="000000"/>
-              </a:buClr>
-              <a:buSzPct val="45000"/>
-              <a:buFont typeface="Wingdings" charset="2"/>
-              <a:buChar char=""/>
-            </a:pPr>
-            <a:endParaRPr b="0" lang="en-US" sz="1800" spc="-1" strike="noStrike">
-              <a:latin typeface="Arial"/>
-            </a:endParaRPr>
-          </a:p>
-          <a:p>
-            <a:pPr marL="285840" indent="-285480">
-              <a:lnSpc>
-                <a:spcPct val="100000"/>
-              </a:lnSpc>
-              <a:buClr>
-                <a:srgbClr val="17375e"/>
-              </a:buClr>
-              <a:buFont typeface="Arial"/>
-              <a:buChar char="•"/>
-            </a:pPr>
-            <a:r>
-              <a:rPr b="0" lang="en-US" sz="1800" spc="-1" strike="noStrike">
-                <a:solidFill>
-                  <a:srgbClr val="17375e"/>
-                </a:solidFill>
-                <a:latin typeface="Calibri"/>
-              </a:rPr>
-              <a:t>Classifications</a:t>
-            </a:r>
-            <a:endParaRPr b="0" lang="en-US" sz="1800" spc="-1" strike="noStrike">
-              <a:latin typeface="Arial"/>
-            </a:endParaRPr>
-          </a:p>
-          <a:p>
-            <a:pPr lvl="1" marL="432000" indent="-216000">
-              <a:lnSpc>
-                <a:spcPct val="100000"/>
-              </a:lnSpc>
-              <a:buClr>
-                <a:srgbClr val="000000"/>
-              </a:buClr>
-              <a:buSzPct val="45000"/>
-              <a:buFont typeface="Wingdings" charset="2"/>
-              <a:buChar char=""/>
-            </a:pPr>
-            <a:r>
-              <a:rPr b="0" lang="en-US" sz="1800" spc="-1" strike="noStrike">
-                <a:solidFill>
-                  <a:srgbClr val="17375e"/>
-                </a:solidFill>
-                <a:latin typeface="Calibri"/>
-              </a:rPr>
-              <a:t>Data is classified bases on three parameters:</a:t>
-            </a:r>
-            <a:endParaRPr b="0" lang="en-US" sz="1800" spc="-1" strike="noStrike">
-              <a:latin typeface="Arial"/>
-            </a:endParaRPr>
-          </a:p>
-          <a:p>
-            <a:pPr lvl="3" marL="864000" indent="-216000">
-              <a:lnSpc>
-                <a:spcPct val="100000"/>
-              </a:lnSpc>
-              <a:buClr>
-                <a:srgbClr val="000000"/>
-              </a:buClr>
-              <a:buSzPct val="45000"/>
-              <a:buFont typeface="Wingdings" charset="2"/>
-              <a:buChar char=""/>
-            </a:pPr>
-            <a:r>
-              <a:rPr b="0" lang="en-US" sz="1800" spc="-1" strike="noStrike">
-                <a:solidFill>
-                  <a:srgbClr val="17375e"/>
-                </a:solidFill>
-                <a:latin typeface="Calibri"/>
-              </a:rPr>
-              <a:t>Age, Ethnicity and Gender</a:t>
-            </a:r>
-            <a:endParaRPr b="0" lang="en-US" sz="1800" spc="-1" strike="noStrike">
-              <a:latin typeface="Arial"/>
-            </a:endParaRPr>
-          </a:p>
-          <a:p>
-            <a:pPr lvl="1" marL="432000" indent="-216000">
-              <a:lnSpc>
-                <a:spcPct val="100000"/>
-              </a:lnSpc>
-              <a:buClr>
-                <a:srgbClr val="000000"/>
-              </a:buClr>
-              <a:buSzPct val="45000"/>
-              <a:buFont typeface="Wingdings" charset="2"/>
-              <a:buChar char=""/>
-            </a:pPr>
-            <a:r>
-              <a:rPr b="0" lang="en-US" sz="1800" spc="-1" strike="noStrike">
-                <a:solidFill>
-                  <a:srgbClr val="17375e"/>
-                </a:solidFill>
-                <a:latin typeface="Calibri"/>
-              </a:rPr>
-              <a:t>Age has a range of 0 to 116</a:t>
-            </a:r>
-            <a:endParaRPr b="0" lang="en-US" sz="1800" spc="-1" strike="noStrike">
-              <a:latin typeface="Arial"/>
-            </a:endParaRPr>
-          </a:p>
-          <a:p>
-            <a:pPr lvl="1" marL="432000" indent="-216000">
-              <a:lnSpc>
-                <a:spcPct val="100000"/>
-              </a:lnSpc>
-              <a:buClr>
-                <a:srgbClr val="000000"/>
-              </a:buClr>
-              <a:buSzPct val="45000"/>
-              <a:buFont typeface="Wingdings" charset="2"/>
-              <a:buChar char=""/>
-            </a:pPr>
-            <a:r>
-              <a:rPr b="0" lang="en-US" sz="1800" spc="-1" strike="noStrike">
-                <a:solidFill>
-                  <a:srgbClr val="17375e"/>
-                </a:solidFill>
-                <a:latin typeface="Calibri"/>
-              </a:rPr>
-              <a:t>Ethnicity is broken down into 5 categories</a:t>
-            </a:r>
-            <a:endParaRPr b="0" lang="en-US" sz="1800" spc="-1" strike="noStrike">
-              <a:latin typeface="Arial"/>
-            </a:endParaRPr>
-          </a:p>
-          <a:p>
-            <a:pPr lvl="1" marL="432000" indent="-216000">
-              <a:lnSpc>
-                <a:spcPct val="100000"/>
-              </a:lnSpc>
-              <a:buClr>
-                <a:srgbClr val="000000"/>
-              </a:buClr>
-              <a:buSzPct val="45000"/>
-              <a:buFont typeface="Wingdings" charset="2"/>
-              <a:buChar char=""/>
-            </a:pPr>
-            <a:r>
-              <a:rPr b="0" lang="en-US" sz="1800" spc="-1" strike="noStrike">
-                <a:solidFill>
-                  <a:srgbClr val="17375e"/>
-                </a:solidFill>
-                <a:latin typeface="Calibri"/>
-              </a:rPr>
-              <a:t>Gender is classified as Male or Female</a:t>
-            </a:r>
-            <a:endParaRPr b="0" lang="en-US" sz="1800" spc="-1" strike="noStrike">
-              <a:latin typeface="Arial"/>
-            </a:endParaRPr>
-          </a:p>
-        </p:txBody>
-      </p:sp>
+      </p:pic>
     </p:spTree>
   </p:cSld>
   <mc:AlternateContent>
@@ -6348,7 +6785,7 @@
       </p:grpSpPr>
       <p:sp>
         <p:nvSpPr>
-          <p:cNvPr id="100" name="CustomShape 1"/>
+          <p:cNvPr id="102" name="CustomShape 1"/>
           <p:cNvSpPr/>
           <p:nvPr/>
         </p:nvSpPr>
@@ -6388,7 +6825,7 @@
                 </a:solidFill>
                 <a:latin typeface="Calibri"/>
               </a:rPr>
-              <a:t>Data Distribution</a:t>
+              <a:t>Data</a:t>
             </a:r>
             <a:endParaRPr b="0" lang="en-US" sz="4400" spc="-1" strike="noStrike">
               <a:latin typeface="Arial"/>
@@ -6398,7 +6835,7 @@
       </p:sp>
       <p:sp>
         <p:nvSpPr>
-          <p:cNvPr id="101" name="CustomShape 2"/>
+          <p:cNvPr id="103" name="CustomShape 2"/>
           <p:cNvSpPr/>
           <p:nvPr/>
         </p:nvSpPr>
@@ -6422,29 +6859,251 @@
           <a:fontRef idx="minor"/>
         </p:style>
       </p:sp>
-      <p:pic>
-        <p:nvPicPr>
-          <p:cNvPr id="102" name="" descr=""/>
-          <p:cNvPicPr/>
+      <p:sp>
+        <p:nvSpPr>
+          <p:cNvPr id="104" name="CustomShape 3"/>
+          <p:cNvSpPr/>
           <p:nvPr/>
-        </p:nvPicPr>
-        <p:blipFill>
-          <a:blip r:embed="rId2"/>
-          <a:stretch/>
-        </p:blipFill>
-        <p:spPr>
-          <a:xfrm>
-            <a:off x="365760" y="1737360"/>
-            <a:ext cx="8412480" cy="3931920"/>
-          </a:xfrm>
-          <a:prstGeom prst="rect">
-            <a:avLst/>
-          </a:prstGeom>
+        </p:nvSpPr>
+        <p:spPr>
+          <a:xfrm>
+            <a:off x="678240" y="1600200"/>
+            <a:ext cx="7002720" cy="2558520"/>
+          </a:xfrm>
+          <a:prstGeom prst="rect">
+            <a:avLst/>
+          </a:prstGeom>
+          <a:noFill/>
           <a:ln>
             <a:noFill/>
           </a:ln>
         </p:spPr>
-      </p:pic>
+        <p:style>
+          <a:lnRef idx="0"/>
+          <a:fillRef idx="0"/>
+          <a:effectRef idx="0"/>
+          <a:fontRef idx="minor"/>
+        </p:style>
+        <p:txBody>
+          <a:bodyPr lIns="90000" rIns="90000" tIns="45000" bIns="45000">
+            <a:spAutoFit/>
+          </a:bodyPr>
+          <a:p>
+            <a:pPr marL="285840" indent="-285480">
+              <a:lnSpc>
+                <a:spcPct val="100000"/>
+              </a:lnSpc>
+              <a:buClr>
+                <a:srgbClr val="17375e"/>
+              </a:buClr>
+              <a:buFont typeface="Arial"/>
+              <a:buChar char="•"/>
+            </a:pPr>
+            <a:r>
+              <a:rPr b="0" lang="en-US" sz="1800" spc="-1" strike="noStrike">
+                <a:solidFill>
+                  <a:srgbClr val="17375e"/>
+                </a:solidFill>
+                <a:latin typeface="Calibri"/>
+              </a:rPr>
+              <a:t>23705 Facial Images</a:t>
+            </a:r>
+            <a:endParaRPr b="0" lang="en-US" sz="1800" spc="-1" strike="noStrike">
+              <a:latin typeface="Arial"/>
+            </a:endParaRPr>
+          </a:p>
+          <a:p>
+            <a:pPr lvl="1" marL="432000" indent="-216000">
+              <a:lnSpc>
+                <a:spcPct val="100000"/>
+              </a:lnSpc>
+              <a:buClr>
+                <a:srgbClr val="000000"/>
+              </a:buClr>
+              <a:buSzPct val="45000"/>
+              <a:buFont typeface="Wingdings" charset="2"/>
+              <a:buChar char=""/>
+            </a:pPr>
+            <a:r>
+              <a:rPr b="0" lang="en-US" sz="1800" spc="-1" strike="noStrike">
+                <a:solidFill>
+                  <a:srgbClr val="17375e"/>
+                </a:solidFill>
+                <a:latin typeface="Calibri"/>
+              </a:rPr>
+              <a:t>Image Size is 48 x 48 pixels </a:t>
+            </a:r>
+            <a:endParaRPr b="0" lang="en-US" sz="1800" spc="-1" strike="noStrike">
+              <a:latin typeface="Arial"/>
+            </a:endParaRPr>
+          </a:p>
+          <a:p>
+            <a:pPr lvl="1" marL="432000" indent="-216000">
+              <a:lnSpc>
+                <a:spcPct val="100000"/>
+              </a:lnSpc>
+              <a:buClr>
+                <a:srgbClr val="000000"/>
+              </a:buClr>
+              <a:buSzPct val="45000"/>
+              <a:buFont typeface="Wingdings" charset="2"/>
+              <a:buChar char=""/>
+            </a:pPr>
+            <a:endParaRPr b="0" lang="en-US" sz="1800" spc="-1" strike="noStrike">
+              <a:latin typeface="Arial"/>
+            </a:endParaRPr>
+          </a:p>
+          <a:p>
+            <a:pPr marL="285840" indent="-285480">
+              <a:lnSpc>
+                <a:spcPct val="100000"/>
+              </a:lnSpc>
+              <a:buClr>
+                <a:srgbClr val="17375e"/>
+              </a:buClr>
+              <a:buFont typeface="Arial"/>
+              <a:buChar char="•"/>
+            </a:pPr>
+            <a:r>
+              <a:rPr b="0" lang="en-US" sz="1800" spc="-1" strike="noStrike">
+                <a:solidFill>
+                  <a:srgbClr val="17375e"/>
+                </a:solidFill>
+                <a:latin typeface="Calibri"/>
+              </a:rPr>
+              <a:t>Classifications</a:t>
+            </a:r>
+            <a:endParaRPr b="0" lang="en-US" sz="1800" spc="-1" strike="noStrike">
+              <a:latin typeface="Arial"/>
+            </a:endParaRPr>
+          </a:p>
+          <a:p>
+            <a:pPr lvl="1" marL="432000" indent="-216000">
+              <a:lnSpc>
+                <a:spcPct val="100000"/>
+              </a:lnSpc>
+              <a:buClr>
+                <a:srgbClr val="000000"/>
+              </a:buClr>
+              <a:buSzPct val="45000"/>
+              <a:buFont typeface="Wingdings" charset="2"/>
+              <a:buChar char=""/>
+            </a:pPr>
+            <a:r>
+              <a:rPr b="0" lang="en-US" sz="1800" spc="-1" strike="noStrike">
+                <a:solidFill>
+                  <a:srgbClr val="17375e"/>
+                </a:solidFill>
+                <a:latin typeface="Calibri"/>
+              </a:rPr>
+              <a:t>Data is classified bases on three parameters:</a:t>
+            </a:r>
+            <a:endParaRPr b="0" lang="en-US" sz="1800" spc="-1" strike="noStrike">
+              <a:latin typeface="Arial"/>
+            </a:endParaRPr>
+          </a:p>
+          <a:p>
+            <a:pPr lvl="3" marL="864000" indent="-216000">
+              <a:lnSpc>
+                <a:spcPct val="100000"/>
+              </a:lnSpc>
+              <a:buClr>
+                <a:srgbClr val="000000"/>
+              </a:buClr>
+              <a:buSzPct val="45000"/>
+              <a:buFont typeface="Wingdings" charset="2"/>
+              <a:buChar char=""/>
+            </a:pPr>
+            <a:r>
+              <a:rPr b="0" lang="en-US" sz="1800" spc="-1" strike="noStrike">
+                <a:solidFill>
+                  <a:srgbClr val="17375e"/>
+                </a:solidFill>
+                <a:latin typeface="Calibri"/>
+              </a:rPr>
+              <a:t>Age, Ethnicity and Gender</a:t>
+            </a:r>
+            <a:endParaRPr b="0" lang="en-US" sz="1800" spc="-1" strike="noStrike">
+              <a:latin typeface="Arial"/>
+            </a:endParaRPr>
+          </a:p>
+          <a:p>
+            <a:pPr lvl="1" marL="432000" indent="-216000">
+              <a:lnSpc>
+                <a:spcPct val="100000"/>
+              </a:lnSpc>
+              <a:buClr>
+                <a:srgbClr val="000000"/>
+              </a:buClr>
+              <a:buSzPct val="45000"/>
+              <a:buFont typeface="Wingdings" charset="2"/>
+              <a:buChar char=""/>
+            </a:pPr>
+            <a:r>
+              <a:rPr b="0" lang="en-US" sz="1800" spc="-1" strike="noStrike">
+                <a:solidFill>
+                  <a:srgbClr val="17375e"/>
+                </a:solidFill>
+                <a:latin typeface="Calibri"/>
+              </a:rPr>
+              <a:t>Age has a range of 0 to 116</a:t>
+            </a:r>
+            <a:endParaRPr b="0" lang="en-US" sz="1800" spc="-1" strike="noStrike">
+              <a:latin typeface="Arial"/>
+            </a:endParaRPr>
+          </a:p>
+          <a:p>
+            <a:pPr lvl="1" marL="432000" indent="-216000">
+              <a:lnSpc>
+                <a:spcPct val="100000"/>
+              </a:lnSpc>
+              <a:buClr>
+                <a:srgbClr val="000000"/>
+              </a:buClr>
+              <a:buSzPct val="45000"/>
+              <a:buFont typeface="Wingdings" charset="2"/>
+              <a:buChar char=""/>
+            </a:pPr>
+            <a:r>
+              <a:rPr b="0" lang="en-US" sz="1800" spc="-1" strike="noStrike">
+                <a:solidFill>
+                  <a:srgbClr val="17375e"/>
+                </a:solidFill>
+                <a:latin typeface="Calibri"/>
+              </a:rPr>
+              <a:t>Ethnicity is broken down into 5 categories</a:t>
+            </a:r>
+            <a:endParaRPr b="0" lang="en-US" sz="1800" spc="-1" strike="noStrike">
+              <a:latin typeface="Arial"/>
+            </a:endParaRPr>
+          </a:p>
+          <a:p>
+            <a:pPr lvl="1" marL="432000" indent="-216000">
+              <a:lnSpc>
+                <a:spcPct val="100000"/>
+              </a:lnSpc>
+              <a:buClr>
+                <a:srgbClr val="000000"/>
+              </a:buClr>
+              <a:buSzPct val="45000"/>
+              <a:buFont typeface="Wingdings" charset="2"/>
+              <a:buChar char=""/>
+            </a:pPr>
+            <a:r>
+              <a:rPr b="0" lang="en-US" sz="1800" spc="-1" strike="noStrike">
+                <a:solidFill>
+                  <a:srgbClr val="17375e"/>
+                </a:solidFill>
+                <a:latin typeface="Calibri"/>
+              </a:rPr>
+              <a:t>Gender is classified as Male or Female</a:t>
+            </a:r>
+            <a:endParaRPr b="0" lang="en-US" sz="1800" spc="-1" strike="noStrike">
+              <a:latin typeface="Arial"/>
+            </a:endParaRPr>
+          </a:p>
+        </p:txBody>
+      </p:sp>
     </p:spTree>
   </p:cSld>
   <mc:AlternateContent>
@@ -6487,7 +7146,7 @@
       </p:grpSpPr>
       <p:sp>
         <p:nvSpPr>
-          <p:cNvPr id="103" name="CustomShape 1"/>
+          <p:cNvPr id="105" name="CustomShape 1"/>
           <p:cNvSpPr/>
           <p:nvPr/>
         </p:nvSpPr>
@@ -6527,7 +7186,7 @@
                 </a:solidFill>
                 <a:latin typeface="Calibri"/>
               </a:rPr>
-              <a:t>Results</a:t>
+              <a:t>Data Distribution</a:t>
             </a:r>
             <a:endParaRPr b="0" lang="en-US" sz="4400" spc="-1" strike="noStrike">
               <a:latin typeface="Arial"/>
@@ -6537,7 +7196,7 @@
       </p:sp>
       <p:sp>
         <p:nvSpPr>
-          <p:cNvPr id="104" name="CustomShape 2"/>
+          <p:cNvPr id="106" name="CustomShape 2"/>
           <p:cNvSpPr/>
           <p:nvPr/>
         </p:nvSpPr>
@@ -6561,367 +7220,29 @@
           <a:fontRef idx="minor"/>
         </p:style>
       </p:sp>
-      <p:sp>
-        <p:nvSpPr>
-          <p:cNvPr id="105" name="CustomShape 3"/>
-          <p:cNvSpPr/>
+      <p:pic>
+        <p:nvPicPr>
+          <p:cNvPr id="107" name="" descr=""/>
+          <p:cNvPicPr/>
           <p:nvPr/>
-        </p:nvSpPr>
-        <p:spPr>
-          <a:xfrm>
-            <a:off x="678240" y="1600200"/>
-            <a:ext cx="3721320" cy="1461960"/>
-          </a:xfrm>
-          <a:prstGeom prst="rect">
-            <a:avLst/>
-          </a:prstGeom>
-          <a:noFill/>
+        </p:nvPicPr>
+        <p:blipFill>
+          <a:blip r:embed="rId2"/>
+          <a:stretch/>
+        </p:blipFill>
+        <p:spPr>
+          <a:xfrm>
+            <a:off x="365760" y="1737360"/>
+            <a:ext cx="8412480" cy="3931920"/>
+          </a:xfrm>
+          <a:prstGeom prst="rect">
+            <a:avLst/>
+          </a:prstGeom>
           <a:ln>
             <a:noFill/>
           </a:ln>
         </p:spPr>
-        <p:style>
-          <a:lnRef idx="0"/>
-          <a:fillRef idx="0"/>
-          <a:effectRef idx="0"/>
-          <a:fontRef idx="minor"/>
-        </p:style>
-      </p:sp>
-      <p:sp>
-        <p:nvSpPr>
-          <p:cNvPr id="106" name="CustomShape 4"/>
-          <p:cNvSpPr/>
-          <p:nvPr/>
-        </p:nvSpPr>
-        <p:spPr>
-          <a:xfrm>
-            <a:off x="678240" y="1600200"/>
-            <a:ext cx="3710880" cy="2832840"/>
-          </a:xfrm>
-          <a:prstGeom prst="rect">
-            <a:avLst/>
-          </a:prstGeom>
-          <a:noFill/>
-          <a:ln>
-            <a:noFill/>
-          </a:ln>
-        </p:spPr>
-        <p:style>
-          <a:lnRef idx="0"/>
-          <a:fillRef idx="0"/>
-          <a:effectRef idx="0"/>
-          <a:fontRef idx="minor"/>
-        </p:style>
-        <p:txBody>
-          <a:bodyPr lIns="90000" rIns="90000" tIns="45000" bIns="45000">
-            <a:spAutoFit/>
-          </a:bodyPr>
-          <a:p>
-            <a:pPr marL="285840" indent="-285480">
-              <a:lnSpc>
-                <a:spcPct val="100000"/>
-              </a:lnSpc>
-              <a:buClr>
-                <a:srgbClr val="17375e"/>
-              </a:buClr>
-              <a:buFont typeface="Arial"/>
-              <a:buChar char="•"/>
-            </a:pPr>
-            <a:r>
-              <a:rPr b="0" lang="en-US" sz="1800" spc="-1" strike="noStrike">
-                <a:solidFill>
-                  <a:srgbClr val="17375e"/>
-                </a:solidFill>
-                <a:latin typeface="Calibri"/>
-              </a:rPr>
-              <a:t>Model Prediction Accuracy:</a:t>
-            </a:r>
-            <a:endParaRPr b="0" lang="en-US" sz="1800" spc="-1" strike="noStrike">
-              <a:latin typeface="Arial"/>
-            </a:endParaRPr>
-          </a:p>
-          <a:p>
-            <a:pPr lvl="1" marL="432000" indent="-216000">
-              <a:lnSpc>
-                <a:spcPct val="100000"/>
-              </a:lnSpc>
-              <a:buClr>
-                <a:srgbClr val="000000"/>
-              </a:buClr>
-              <a:buSzPct val="45000"/>
-              <a:buFont typeface="Wingdings" charset="2"/>
-              <a:buChar char=""/>
-            </a:pPr>
-            <a:r>
-              <a:rPr b="0" lang="en-US" sz="1800" spc="-1" strike="noStrike">
-                <a:solidFill>
-                  <a:srgbClr val="17375e"/>
-                </a:solidFill>
-                <a:latin typeface="Calibri"/>
-              </a:rPr>
-              <a:t>Race Accuracy of 76%</a:t>
-            </a:r>
-            <a:endParaRPr b="0" lang="en-US" sz="1800" spc="-1" strike="noStrike">
-              <a:latin typeface="Arial"/>
-            </a:endParaRPr>
-          </a:p>
-          <a:p>
-            <a:pPr lvl="2" marL="648000" indent="-216000">
-              <a:lnSpc>
-                <a:spcPct val="100000"/>
-              </a:lnSpc>
-              <a:buClr>
-                <a:srgbClr val="000000"/>
-              </a:buClr>
-              <a:buSzPct val="45000"/>
-              <a:buFont typeface="Wingdings" charset="2"/>
-              <a:buChar char=""/>
-            </a:pPr>
-            <a:r>
-              <a:rPr b="0" lang="en-US" sz="1800" spc="-1" strike="noStrike">
-                <a:solidFill>
-                  <a:srgbClr val="17375e"/>
-                </a:solidFill>
-                <a:latin typeface="Calibri"/>
-              </a:rPr>
-              <a:t>Category 0 ……………..82%</a:t>
-            </a:r>
-            <a:endParaRPr b="0" lang="en-US" sz="1800" spc="-1" strike="noStrike">
-              <a:latin typeface="Arial"/>
-            </a:endParaRPr>
-          </a:p>
-          <a:p>
-            <a:pPr lvl="2" marL="648000" indent="-216000">
-              <a:lnSpc>
-                <a:spcPct val="100000"/>
-              </a:lnSpc>
-              <a:buClr>
-                <a:srgbClr val="000000"/>
-              </a:buClr>
-              <a:buSzPct val="45000"/>
-              <a:buFont typeface="Wingdings" charset="2"/>
-              <a:buChar char=""/>
-            </a:pPr>
-            <a:r>
-              <a:rPr b="0" lang="en-US" sz="1800" spc="-1" strike="noStrike">
-                <a:solidFill>
-                  <a:srgbClr val="17375e"/>
-                </a:solidFill>
-                <a:latin typeface="Calibri"/>
-              </a:rPr>
-              <a:t>Category 1 ……………..81%</a:t>
-            </a:r>
-            <a:endParaRPr b="0" lang="en-US" sz="1800" spc="-1" strike="noStrike">
-              <a:latin typeface="Arial"/>
-            </a:endParaRPr>
-          </a:p>
-          <a:p>
-            <a:pPr lvl="2" marL="648000" indent="-216000">
-              <a:lnSpc>
-                <a:spcPct val="100000"/>
-              </a:lnSpc>
-              <a:buClr>
-                <a:srgbClr val="000000"/>
-              </a:buClr>
-              <a:buSzPct val="45000"/>
-              <a:buFont typeface="Wingdings" charset="2"/>
-              <a:buChar char=""/>
-            </a:pPr>
-            <a:r>
-              <a:rPr b="0" lang="en-US" sz="1800" spc="-1" strike="noStrike">
-                <a:solidFill>
-                  <a:srgbClr val="17375e"/>
-                </a:solidFill>
-                <a:latin typeface="Calibri"/>
-              </a:rPr>
-              <a:t>Category 2 ……………..78%</a:t>
-            </a:r>
-            <a:endParaRPr b="0" lang="en-US" sz="1800" spc="-1" strike="noStrike">
-              <a:latin typeface="Arial"/>
-            </a:endParaRPr>
-          </a:p>
-          <a:p>
-            <a:pPr lvl="2" marL="648000" indent="-216000">
-              <a:lnSpc>
-                <a:spcPct val="100000"/>
-              </a:lnSpc>
-              <a:buClr>
-                <a:srgbClr val="000000"/>
-              </a:buClr>
-              <a:buSzPct val="45000"/>
-              <a:buFont typeface="Wingdings" charset="2"/>
-              <a:buChar char=""/>
-            </a:pPr>
-            <a:r>
-              <a:rPr b="0" lang="en-US" sz="1800" spc="-1" strike="noStrike">
-                <a:solidFill>
-                  <a:srgbClr val="17375e"/>
-                </a:solidFill>
-                <a:latin typeface="Calibri"/>
-              </a:rPr>
-              <a:t>Category 3 ……………..69%</a:t>
-            </a:r>
-            <a:endParaRPr b="0" lang="en-US" sz="1800" spc="-1" strike="noStrike">
-              <a:latin typeface="Arial"/>
-            </a:endParaRPr>
-          </a:p>
-          <a:p>
-            <a:pPr lvl="2" marL="648000" indent="-216000">
-              <a:lnSpc>
-                <a:spcPct val="100000"/>
-              </a:lnSpc>
-              <a:buClr>
-                <a:srgbClr val="000000"/>
-              </a:buClr>
-              <a:buSzPct val="45000"/>
-              <a:buFont typeface="Wingdings" charset="2"/>
-              <a:buChar char=""/>
-            </a:pPr>
-            <a:r>
-              <a:rPr b="0" lang="en-US" sz="1800" spc="-1" strike="noStrike">
-                <a:solidFill>
-                  <a:srgbClr val="17375e"/>
-                </a:solidFill>
-                <a:latin typeface="Calibri"/>
-              </a:rPr>
-              <a:t>Category 4 ……………..11%</a:t>
-            </a:r>
-            <a:endParaRPr b="0" lang="en-US" sz="1800" spc="-1" strike="noStrike">
-              <a:latin typeface="Arial"/>
-            </a:endParaRPr>
-          </a:p>
-          <a:p>
-            <a:pPr lvl="1" marL="432000" indent="-216000">
-              <a:lnSpc>
-                <a:spcPct val="100000"/>
-              </a:lnSpc>
-              <a:buClr>
-                <a:srgbClr val="000000"/>
-              </a:buClr>
-              <a:buSzPct val="45000"/>
-              <a:buFont typeface="Wingdings" charset="2"/>
-              <a:buChar char=""/>
-            </a:pPr>
-            <a:r>
-              <a:rPr b="0" lang="en-US" sz="1800" spc="-1" strike="noStrike">
-                <a:solidFill>
-                  <a:srgbClr val="17375e"/>
-                </a:solidFill>
-                <a:latin typeface="Calibri"/>
-              </a:rPr>
-              <a:t>Gender Accuracy of 89%</a:t>
-            </a:r>
-            <a:endParaRPr b="0" lang="en-US" sz="1800" spc="-1" strike="noStrike">
-              <a:latin typeface="Arial"/>
-            </a:endParaRPr>
-          </a:p>
-          <a:p>
-            <a:pPr lvl="2" marL="648000" indent="-216000">
-              <a:lnSpc>
-                <a:spcPct val="100000"/>
-              </a:lnSpc>
-              <a:buClr>
-                <a:srgbClr val="000000"/>
-              </a:buClr>
-              <a:buSzPct val="45000"/>
-              <a:buFont typeface="Wingdings" charset="2"/>
-              <a:buChar char=""/>
-            </a:pPr>
-            <a:r>
-              <a:rPr b="0" lang="en-US" sz="1800" spc="-1" strike="noStrike">
-                <a:solidFill>
-                  <a:srgbClr val="17375e"/>
-                </a:solidFill>
-                <a:latin typeface="Calibri"/>
-              </a:rPr>
-              <a:t>Male ……………………...89 % </a:t>
-            </a:r>
-            <a:endParaRPr b="0" lang="en-US" sz="1800" spc="-1" strike="noStrike">
-              <a:latin typeface="Arial"/>
-            </a:endParaRPr>
-          </a:p>
-          <a:p>
-            <a:pPr lvl="2" marL="648000" indent="-216000">
-              <a:lnSpc>
-                <a:spcPct val="100000"/>
-              </a:lnSpc>
-              <a:buClr>
-                <a:srgbClr val="000000"/>
-              </a:buClr>
-              <a:buSzPct val="45000"/>
-              <a:buFont typeface="Wingdings" charset="2"/>
-              <a:buChar char=""/>
-            </a:pPr>
-            <a:r>
-              <a:rPr b="0" lang="en-US" sz="1800" spc="-1" strike="noStrike">
-                <a:solidFill>
-                  <a:srgbClr val="17375e"/>
-                </a:solidFill>
-                <a:latin typeface="Calibri"/>
-              </a:rPr>
-              <a:t>Female …………………..88 %</a:t>
-            </a:r>
-            <a:endParaRPr b="0" lang="en-US" sz="1800" spc="-1" strike="noStrike">
-              <a:latin typeface="Arial"/>
-            </a:endParaRPr>
-          </a:p>
-        </p:txBody>
-      </p:sp>
-      <p:sp>
-        <p:nvSpPr>
-          <p:cNvPr id="107" name="CustomShape 5"/>
-          <p:cNvSpPr/>
-          <p:nvPr/>
-        </p:nvSpPr>
-        <p:spPr>
-          <a:xfrm>
-            <a:off x="4975920" y="1645920"/>
-            <a:ext cx="3710880" cy="364680"/>
-          </a:xfrm>
-          <a:prstGeom prst="rect">
-            <a:avLst/>
-          </a:prstGeom>
-          <a:noFill/>
-          <a:ln>
-            <a:noFill/>
-          </a:ln>
-        </p:spPr>
-        <p:style>
-          <a:lnRef idx="0"/>
-          <a:fillRef idx="0"/>
-          <a:effectRef idx="0"/>
-          <a:fontRef idx="minor"/>
-        </p:style>
-        <p:txBody>
-          <a:bodyPr lIns="90000" rIns="90000" tIns="45000" bIns="45000">
-            <a:spAutoFit/>
-          </a:bodyPr>
-          <a:p>
-            <a:pPr marL="285840" indent="-285480">
-              <a:lnSpc>
-                <a:spcPct val="100000"/>
-              </a:lnSpc>
-              <a:buClr>
-                <a:srgbClr val="17375e"/>
-              </a:buClr>
-              <a:buFont typeface="Arial"/>
-              <a:buChar char="•"/>
-            </a:pPr>
-            <a:r>
-              <a:rPr b="0" lang="en-US" sz="1800" spc="-1" strike="noStrike">
-                <a:solidFill>
-                  <a:srgbClr val="17375e"/>
-                </a:solidFill>
-                <a:latin typeface="Calibri"/>
-              </a:rPr>
-              <a:t>Stats for Age Model</a:t>
-            </a:r>
-            <a:endParaRPr b="0" lang="en-US" sz="1800" spc="-1" strike="noStrike">
-              <a:latin typeface="Arial"/>
-            </a:endParaRPr>
-          </a:p>
-        </p:txBody>
-      </p:sp>
+      </p:pic>
     </p:spTree>
   </p:cSld>
   <mc:AlternateContent>

</xml_diff>

<commit_message>
Update data distribution images
</commit_message>
<xml_diff>
--- a/Project Presentaion - Group 2- v1.2.0.pptx
+++ b/Project Presentaion - Group 2- v1.2.0.pptx
@@ -3683,8 +3683,54 @@
         </p:blipFill>
         <p:spPr>
           <a:xfrm>
-            <a:off x="365760" y="1737360"/>
-            <a:ext cx="8412120" cy="3931560"/>
+            <a:off x="603360" y="1371600"/>
+            <a:ext cx="3008520" cy="2743200"/>
+          </a:xfrm>
+          <a:prstGeom prst="rect">
+            <a:avLst/>
+          </a:prstGeom>
+          <a:ln>
+            <a:noFill/>
+          </a:ln>
+        </p:spPr>
+      </p:pic>
+      <p:pic>
+        <p:nvPicPr>
+          <p:cNvPr id="104" name="" descr=""/>
+          <p:cNvPicPr/>
+          <p:nvPr/>
+        </p:nvPicPr>
+        <p:blipFill>
+          <a:blip r:embed="rId3"/>
+          <a:stretch/>
+        </p:blipFill>
+        <p:spPr>
+          <a:xfrm>
+            <a:off x="5486400" y="1328760"/>
+            <a:ext cx="3291840" cy="2743200"/>
+          </a:xfrm>
+          <a:prstGeom prst="rect">
+            <a:avLst/>
+          </a:prstGeom>
+          <a:ln>
+            <a:noFill/>
+          </a:ln>
+        </p:spPr>
+      </p:pic>
+      <p:pic>
+        <p:nvPicPr>
+          <p:cNvPr id="105" name="" descr=""/>
+          <p:cNvPicPr/>
+          <p:nvPr/>
+        </p:nvPicPr>
+        <p:blipFill>
+          <a:blip r:embed="rId4"/>
+          <a:stretch/>
+        </p:blipFill>
+        <p:spPr>
+          <a:xfrm>
+            <a:off x="3108960" y="3017520"/>
+            <a:ext cx="2706480" cy="2743200"/>
           </a:xfrm>
           <a:prstGeom prst="rect">
             <a:avLst/>
@@ -3736,7 +3782,7 @@
       </p:grpSpPr>
       <p:sp>
         <p:nvSpPr>
-          <p:cNvPr id="104" name="CustomShape 1"/>
+          <p:cNvPr id="106" name="CustomShape 1"/>
           <p:cNvSpPr/>
           <p:nvPr/>
         </p:nvSpPr>
@@ -3787,7 +3833,7 @@
       </p:sp>
       <p:sp>
         <p:nvSpPr>
-          <p:cNvPr id="105" name="CustomShape 2"/>
+          <p:cNvPr id="107" name="CustomShape 2"/>
           <p:cNvSpPr/>
           <p:nvPr/>
         </p:nvSpPr>
@@ -3813,7 +3859,7 @@
       </p:sp>
       <p:sp>
         <p:nvSpPr>
-          <p:cNvPr id="106" name="CustomShape 3"/>
+          <p:cNvPr id="108" name="CustomShape 3"/>
           <p:cNvSpPr/>
           <p:nvPr/>
         </p:nvSpPr>
@@ -3839,7 +3885,7 @@
       </p:sp>
       <p:sp>
         <p:nvSpPr>
-          <p:cNvPr id="107" name="CustomShape 4"/>
+          <p:cNvPr id="109" name="CustomShape 4"/>
           <p:cNvSpPr/>
           <p:nvPr/>
         </p:nvSpPr>
@@ -4208,7 +4254,7 @@
       </p:grpSpPr>
       <p:sp>
         <p:nvSpPr>
-          <p:cNvPr id="108" name="CustomShape 1"/>
+          <p:cNvPr id="110" name="CustomShape 1"/>
           <p:cNvSpPr/>
           <p:nvPr/>
         </p:nvSpPr>
@@ -4259,7 +4305,7 @@
       </p:sp>
       <p:sp>
         <p:nvSpPr>
-          <p:cNvPr id="109" name="CustomShape 2"/>
+          <p:cNvPr id="111" name="CustomShape 2"/>
           <p:cNvSpPr/>
           <p:nvPr/>
         </p:nvSpPr>
@@ -4285,7 +4331,7 @@
       </p:sp>
       <p:pic>
         <p:nvPicPr>
-          <p:cNvPr id="110" name="" descr=""/>
+          <p:cNvPr id="112" name="" descr=""/>
           <p:cNvPicPr/>
           <p:nvPr/>
         </p:nvPicPr>
@@ -4308,7 +4354,7 @@
       </p:pic>
       <p:pic>
         <p:nvPicPr>
-          <p:cNvPr id="111" name="" descr=""/>
+          <p:cNvPr id="113" name="" descr=""/>
           <p:cNvPicPr/>
           <p:nvPr/>
         </p:nvPicPr>
@@ -4331,7 +4377,7 @@
       </p:pic>
       <p:pic>
         <p:nvPicPr>
-          <p:cNvPr id="112" name="" descr=""/>
+          <p:cNvPr id="114" name="" descr=""/>
           <p:cNvPicPr/>
           <p:nvPr/>
         </p:nvPicPr>
@@ -4394,7 +4440,7 @@
       </p:grpSpPr>
       <p:sp>
         <p:nvSpPr>
-          <p:cNvPr id="113" name="CustomShape 1"/>
+          <p:cNvPr id="115" name="CustomShape 1"/>
           <p:cNvSpPr/>
           <p:nvPr/>
         </p:nvSpPr>
@@ -4445,7 +4491,7 @@
       </p:sp>
       <p:sp>
         <p:nvSpPr>
-          <p:cNvPr id="114" name="CustomShape 2"/>
+          <p:cNvPr id="116" name="CustomShape 2"/>
           <p:cNvSpPr/>
           <p:nvPr/>
         </p:nvSpPr>
@@ -4471,7 +4517,7 @@
       </p:sp>
       <p:sp>
         <p:nvSpPr>
-          <p:cNvPr id="115" name="CustomShape 3"/>
+          <p:cNvPr id="117" name="CustomShape 3"/>
           <p:cNvSpPr/>
           <p:nvPr/>
         </p:nvSpPr>
@@ -4537,7 +4583,7 @@
       </p:grpSpPr>
       <p:sp>
         <p:nvSpPr>
-          <p:cNvPr id="116" name="CustomShape 1"/>
+          <p:cNvPr id="118" name="CustomShape 1"/>
           <p:cNvSpPr/>
           <p:nvPr/>
         </p:nvSpPr>
@@ -4588,7 +4634,7 @@
       </p:sp>
       <p:sp>
         <p:nvSpPr>
-          <p:cNvPr id="117" name="CustomShape 2"/>
+          <p:cNvPr id="119" name="CustomShape 2"/>
           <p:cNvSpPr/>
           <p:nvPr/>
         </p:nvSpPr>
@@ -4614,7 +4660,7 @@
       </p:sp>
       <p:sp>
         <p:nvSpPr>
-          <p:cNvPr id="118" name="CustomShape 3"/>
+          <p:cNvPr id="120" name="CustomShape 3"/>
           <p:cNvSpPr/>
           <p:nvPr/>
         </p:nvSpPr>
@@ -4680,7 +4726,7 @@
       </p:grpSpPr>
       <p:sp>
         <p:nvSpPr>
-          <p:cNvPr id="119" name="CustomShape 1"/>
+          <p:cNvPr id="121" name="CustomShape 1"/>
           <p:cNvSpPr/>
           <p:nvPr/>
         </p:nvSpPr>
@@ -4731,7 +4777,7 @@
       </p:sp>
       <p:sp>
         <p:nvSpPr>
-          <p:cNvPr id="120" name="CustomShape 2"/>
+          <p:cNvPr id="122" name="CustomShape 2"/>
           <p:cNvSpPr/>
           <p:nvPr/>
         </p:nvSpPr>
@@ -4757,7 +4803,7 @@
       </p:sp>
       <p:sp>
         <p:nvSpPr>
-          <p:cNvPr id="121" name="CustomShape 3"/>
+          <p:cNvPr id="123" name="CustomShape 3"/>
           <p:cNvSpPr/>
           <p:nvPr/>
         </p:nvSpPr>
@@ -4823,7 +4869,7 @@
       </p:grpSpPr>
       <p:sp>
         <p:nvSpPr>
-          <p:cNvPr id="122" name="CustomShape 1"/>
+          <p:cNvPr id="124" name="CustomShape 1"/>
           <p:cNvSpPr/>
           <p:nvPr/>
         </p:nvSpPr>
@@ -4913,7 +4959,7 @@
       </p:grpSpPr>
       <p:sp>
         <p:nvSpPr>
-          <p:cNvPr id="123" name="CustomShape 1"/>
+          <p:cNvPr id="125" name="CustomShape 1"/>
           <p:cNvSpPr/>
           <p:nvPr/>
         </p:nvSpPr>
@@ -6841,7 +6887,7 @@
         <p:spPr>
           <a:xfrm>
             <a:off x="678240" y="1600200"/>
-            <a:ext cx="7002360" cy="2558520"/>
+            <a:ext cx="7002360" cy="3107160"/>
           </a:xfrm>
           <a:prstGeom prst="rect">
             <a:avLst/>
@@ -7072,6 +7118,47 @@
                 <a:ea typeface="DejaVu Sans"/>
               </a:rPr>
               <a:t>Gender is classified as Male or Female</a:t>
+            </a:r>
+            <a:endParaRPr b="0" lang="en-US" sz="1800" spc="-1" strike="noStrike">
+              <a:latin typeface="Arial"/>
+            </a:endParaRPr>
+          </a:p>
+          <a:p>
+            <a:pPr lvl="1" marL="432000" indent="-215640">
+              <a:lnSpc>
+                <a:spcPct val="100000"/>
+              </a:lnSpc>
+              <a:buClr>
+                <a:srgbClr val="000000"/>
+              </a:buClr>
+              <a:buSzPct val="45000"/>
+              <a:buFont typeface="Wingdings" charset="2"/>
+              <a:buChar char=""/>
+            </a:pPr>
+            <a:endParaRPr b="0" lang="en-US" sz="1800" spc="-1" strike="noStrike">
+              <a:latin typeface="Arial"/>
+            </a:endParaRPr>
+          </a:p>
+          <a:p>
+            <a:pPr marL="285840" indent="-285120">
+              <a:lnSpc>
+                <a:spcPct val="100000"/>
+              </a:lnSpc>
+              <a:buClr>
+                <a:srgbClr val="17375e"/>
+              </a:buClr>
+              <a:buFont typeface="Arial"/>
+              <a:buChar char="•"/>
+            </a:pPr>
+            <a:r>
+              <a:rPr b="0" lang="en-US" sz="1800" spc="-1" strike="noStrike">
+                <a:solidFill>
+                  <a:srgbClr val="17375e"/>
+                </a:solidFill>
+                <a:latin typeface="Calibri"/>
+                <a:ea typeface="DejaVu Sans"/>
+              </a:rPr>
+              <a:t>Data Distribution was not uniform</a:t>
             </a:r>
             <a:endParaRPr b="0" lang="en-US" sz="1800" spc="-1" strike="noStrike">
               <a:latin typeface="Arial"/>

</xml_diff>

<commit_message>
Started Arch and Meth Section
</commit_message>
<xml_diff>
--- a/Project Presentaion - Group 2- v1.2.0.pptx
+++ b/Project Presentaion - Group 2- v1.2.0.pptx
@@ -3596,7 +3596,7 @@
       </p:grpSpPr>
       <p:sp>
         <p:nvSpPr>
-          <p:cNvPr id="101" name="CustomShape 1"/>
+          <p:cNvPr id="102" name="CustomShape 1"/>
           <p:cNvSpPr/>
           <p:nvPr/>
         </p:nvSpPr>
@@ -3647,7 +3647,7 @@
       </p:sp>
       <p:sp>
         <p:nvSpPr>
-          <p:cNvPr id="102" name="CustomShape 2"/>
+          <p:cNvPr id="103" name="CustomShape 2"/>
           <p:cNvSpPr/>
           <p:nvPr/>
         </p:nvSpPr>
@@ -3673,7 +3673,7 @@
       </p:sp>
       <p:pic>
         <p:nvPicPr>
-          <p:cNvPr id="103" name="" descr=""/>
+          <p:cNvPr id="104" name="" descr=""/>
           <p:cNvPicPr/>
           <p:nvPr/>
         </p:nvPicPr>
@@ -3696,7 +3696,7 @@
       </p:pic>
       <p:pic>
         <p:nvPicPr>
-          <p:cNvPr id="104" name="" descr=""/>
+          <p:cNvPr id="105" name="" descr=""/>
           <p:cNvPicPr/>
           <p:nvPr/>
         </p:nvPicPr>
@@ -3719,7 +3719,7 @@
       </p:pic>
       <p:pic>
         <p:nvPicPr>
-          <p:cNvPr id="105" name="" descr=""/>
+          <p:cNvPr id="106" name="" descr=""/>
           <p:cNvPicPr/>
           <p:nvPr/>
         </p:nvPicPr>
@@ -3782,7 +3782,7 @@
       </p:grpSpPr>
       <p:sp>
         <p:nvSpPr>
-          <p:cNvPr id="106" name="CustomShape 1"/>
+          <p:cNvPr id="107" name="CustomShape 1"/>
           <p:cNvSpPr/>
           <p:nvPr/>
         </p:nvSpPr>
@@ -3833,7 +3833,7 @@
       </p:sp>
       <p:sp>
         <p:nvSpPr>
-          <p:cNvPr id="107" name="CustomShape 2"/>
+          <p:cNvPr id="108" name="CustomShape 2"/>
           <p:cNvSpPr/>
           <p:nvPr/>
         </p:nvSpPr>
@@ -3859,7 +3859,7 @@
       </p:sp>
       <p:sp>
         <p:nvSpPr>
-          <p:cNvPr id="108" name="CustomShape 3"/>
+          <p:cNvPr id="109" name="CustomShape 3"/>
           <p:cNvSpPr/>
           <p:nvPr/>
         </p:nvSpPr>
@@ -3885,7 +3885,7 @@
       </p:sp>
       <p:sp>
         <p:nvSpPr>
-          <p:cNvPr id="109" name="CustomShape 4"/>
+          <p:cNvPr id="110" name="CustomShape 4"/>
           <p:cNvSpPr/>
           <p:nvPr/>
         </p:nvSpPr>
@@ -4254,7 +4254,7 @@
       </p:grpSpPr>
       <p:sp>
         <p:nvSpPr>
-          <p:cNvPr id="110" name="CustomShape 1"/>
+          <p:cNvPr id="111" name="CustomShape 1"/>
           <p:cNvSpPr/>
           <p:nvPr/>
         </p:nvSpPr>
@@ -4305,7 +4305,7 @@
       </p:sp>
       <p:sp>
         <p:nvSpPr>
-          <p:cNvPr id="111" name="CustomShape 2"/>
+          <p:cNvPr id="112" name="CustomShape 2"/>
           <p:cNvSpPr/>
           <p:nvPr/>
         </p:nvSpPr>
@@ -4331,7 +4331,7 @@
       </p:sp>
       <p:pic>
         <p:nvPicPr>
-          <p:cNvPr id="112" name="" descr=""/>
+          <p:cNvPr id="113" name="" descr=""/>
           <p:cNvPicPr/>
           <p:nvPr/>
         </p:nvPicPr>
@@ -4354,7 +4354,7 @@
       </p:pic>
       <p:pic>
         <p:nvPicPr>
-          <p:cNvPr id="113" name="" descr=""/>
+          <p:cNvPr id="114" name="" descr=""/>
           <p:cNvPicPr/>
           <p:nvPr/>
         </p:nvPicPr>
@@ -4377,7 +4377,7 @@
       </p:pic>
       <p:pic>
         <p:nvPicPr>
-          <p:cNvPr id="114" name="" descr=""/>
+          <p:cNvPr id="115" name="" descr=""/>
           <p:cNvPicPr/>
           <p:nvPr/>
         </p:nvPicPr>
@@ -4440,7 +4440,7 @@
       </p:grpSpPr>
       <p:sp>
         <p:nvSpPr>
-          <p:cNvPr id="115" name="CustomShape 1"/>
+          <p:cNvPr id="116" name="CustomShape 1"/>
           <p:cNvSpPr/>
           <p:nvPr/>
         </p:nvSpPr>
@@ -4491,7 +4491,7 @@
       </p:sp>
       <p:sp>
         <p:nvSpPr>
-          <p:cNvPr id="116" name="CustomShape 2"/>
+          <p:cNvPr id="117" name="CustomShape 2"/>
           <p:cNvSpPr/>
           <p:nvPr/>
         </p:nvSpPr>
@@ -4517,7 +4517,7 @@
       </p:sp>
       <p:sp>
         <p:nvSpPr>
-          <p:cNvPr id="117" name="CustomShape 3"/>
+          <p:cNvPr id="118" name="CustomShape 3"/>
           <p:cNvSpPr/>
           <p:nvPr/>
         </p:nvSpPr>
@@ -4583,7 +4583,7 @@
       </p:grpSpPr>
       <p:sp>
         <p:nvSpPr>
-          <p:cNvPr id="118" name="CustomShape 1"/>
+          <p:cNvPr id="119" name="CustomShape 1"/>
           <p:cNvSpPr/>
           <p:nvPr/>
         </p:nvSpPr>
@@ -4634,7 +4634,7 @@
       </p:sp>
       <p:sp>
         <p:nvSpPr>
-          <p:cNvPr id="119" name="CustomShape 2"/>
+          <p:cNvPr id="120" name="CustomShape 2"/>
           <p:cNvSpPr/>
           <p:nvPr/>
         </p:nvSpPr>
@@ -4660,7 +4660,7 @@
       </p:sp>
       <p:sp>
         <p:nvSpPr>
-          <p:cNvPr id="120" name="CustomShape 3"/>
+          <p:cNvPr id="121" name="CustomShape 3"/>
           <p:cNvSpPr/>
           <p:nvPr/>
         </p:nvSpPr>
@@ -4726,7 +4726,7 @@
       </p:grpSpPr>
       <p:sp>
         <p:nvSpPr>
-          <p:cNvPr id="121" name="CustomShape 1"/>
+          <p:cNvPr id="122" name="CustomShape 1"/>
           <p:cNvSpPr/>
           <p:nvPr/>
         </p:nvSpPr>
@@ -4777,7 +4777,7 @@
       </p:sp>
       <p:sp>
         <p:nvSpPr>
-          <p:cNvPr id="122" name="CustomShape 2"/>
+          <p:cNvPr id="123" name="CustomShape 2"/>
           <p:cNvSpPr/>
           <p:nvPr/>
         </p:nvSpPr>
@@ -4803,7 +4803,7 @@
       </p:sp>
       <p:sp>
         <p:nvSpPr>
-          <p:cNvPr id="123" name="CustomShape 3"/>
+          <p:cNvPr id="124" name="CustomShape 3"/>
           <p:cNvSpPr/>
           <p:nvPr/>
         </p:nvSpPr>
@@ -4869,7 +4869,7 @@
       </p:grpSpPr>
       <p:sp>
         <p:nvSpPr>
-          <p:cNvPr id="124" name="CustomShape 1"/>
+          <p:cNvPr id="125" name="CustomShape 1"/>
           <p:cNvSpPr/>
           <p:nvPr/>
         </p:nvSpPr>
@@ -4959,7 +4959,7 @@
       </p:grpSpPr>
       <p:sp>
         <p:nvSpPr>
-          <p:cNvPr id="125" name="CustomShape 1"/>
+          <p:cNvPr id="126" name="CustomShape 1"/>
           <p:cNvSpPr/>
           <p:nvPr/>
         </p:nvSpPr>
@@ -5550,7 +5550,7 @@
         <p:spPr>
           <a:xfrm>
             <a:off x="678240" y="1600200"/>
-            <a:ext cx="7368120" cy="2832840"/>
+            <a:ext cx="7368120" cy="3381480"/>
           </a:xfrm>
           <a:prstGeom prst="rect">
             <a:avLst/>
@@ -5659,7 +5659,47 @@
                 <a:latin typeface="Calibri"/>
                 <a:ea typeface="DejaVu Sans"/>
               </a:rPr>
-              <a:t>Create a single model that can determine all Three of the categories </a:t>
+              <a:t>Create a single model that can determine all Three of the categories</a:t>
+            </a:r>
+            <a:endParaRPr b="0" lang="en-US" sz="1800" spc="-1" strike="noStrike">
+              <a:latin typeface="Arial"/>
+            </a:endParaRPr>
+          </a:p>
+          <a:p>
+            <a:pPr marL="285840" indent="-285120">
+              <a:lnSpc>
+                <a:spcPct val="100000"/>
+              </a:lnSpc>
+              <a:buClr>
+                <a:srgbClr val="17375e"/>
+              </a:buClr>
+              <a:buFont typeface="Arial"/>
+              <a:buChar char="•"/>
+            </a:pPr>
+            <a:endParaRPr b="0" lang="en-US" sz="1800" spc="-1" strike="noStrike">
+              <a:latin typeface="Arial"/>
+            </a:endParaRPr>
+          </a:p>
+          <a:p>
+            <a:pPr marL="285840" indent="-285120">
+              <a:lnSpc>
+                <a:spcPct val="100000"/>
+              </a:lnSpc>
+              <a:buClr>
+                <a:srgbClr val="17375e"/>
+              </a:buClr>
+              <a:buFont typeface="Arial"/>
+              <a:buChar char="•"/>
+            </a:pPr>
+            <a:r>
+              <a:rPr b="0" lang="en-US" sz="1800" spc="-1" strike="noStrike">
+                <a:solidFill>
+                  <a:srgbClr val="17375e"/>
+                </a:solidFill>
+                <a:latin typeface="Calibri"/>
+                <a:ea typeface="DejaVu Sans"/>
+              </a:rPr>
+              <a:t>Determine mood of person based on image (Happy, Sad, etc.) </a:t>
             </a:r>
             <a:endParaRPr b="0" lang="en-US" sz="1800" spc="-1" strike="noStrike">
               <a:latin typeface="Arial"/>
@@ -6073,6 +6113,42 @@
           </a:ln>
         </p:spPr>
       </p:pic>
+      <p:sp>
+        <p:nvSpPr>
+          <p:cNvPr id="91" name="TextShape 3"/>
+          <p:cNvSpPr txBox="1"/>
+          <p:nvPr/>
+        </p:nvSpPr>
+        <p:spPr>
+          <a:xfrm>
+            <a:off x="2286000" y="1188720"/>
+            <a:ext cx="4909680" cy="401400"/>
+          </a:xfrm>
+          <a:prstGeom prst="rect">
+            <a:avLst/>
+          </a:prstGeom>
+          <a:noFill/>
+          <a:ln>
+            <a:noFill/>
+          </a:ln>
+        </p:spPr>
+        <p:txBody>
+          <a:bodyPr lIns="90000" rIns="90000" tIns="45000" bIns="45000">
+            <a:spAutoFit/>
+          </a:bodyPr>
+          <a:p>
+            <a:r>
+              <a:rPr b="0" lang="en-US" sz="1800" spc="-1" strike="noStrike">
+                <a:latin typeface="Noto Sans"/>
+              </a:rPr>
+              <a:t>Diagram of a Machine Learning (ML) system</a:t>
+            </a:r>
+            <a:endParaRPr b="0" lang="en-US" sz="1800" spc="-1" strike="noStrike">
+              <a:latin typeface="Arial"/>
+            </a:endParaRPr>
+          </a:p>
+        </p:txBody>
+      </p:sp>
     </p:spTree>
   </p:cSld>
   <mc:AlternateContent>
@@ -6115,7 +6191,7 @@
       </p:grpSpPr>
       <p:sp>
         <p:nvSpPr>
-          <p:cNvPr id="91" name="CustomShape 1"/>
+          <p:cNvPr id="92" name="CustomShape 1"/>
           <p:cNvSpPr/>
           <p:nvPr/>
         </p:nvSpPr>
@@ -6166,7 +6242,7 @@
       </p:sp>
       <p:sp>
         <p:nvSpPr>
-          <p:cNvPr id="92" name="CustomShape 2"/>
+          <p:cNvPr id="93" name="CustomShape 2"/>
           <p:cNvSpPr/>
           <p:nvPr/>
         </p:nvSpPr>
@@ -6217,7 +6293,7 @@
       </p:sp>
       <p:sp>
         <p:nvSpPr>
-          <p:cNvPr id="93" name="CustomShape 3"/>
+          <p:cNvPr id="94" name="CustomShape 3"/>
           <p:cNvSpPr/>
           <p:nvPr/>
         </p:nvSpPr>
@@ -6522,7 +6598,7 @@
       </p:grpSpPr>
       <p:sp>
         <p:nvSpPr>
-          <p:cNvPr id="94" name="CustomShape 1"/>
+          <p:cNvPr id="95" name="CustomShape 1"/>
           <p:cNvSpPr/>
           <p:nvPr/>
         </p:nvSpPr>
@@ -6573,14 +6649,14 @@
       </p:sp>
       <p:sp>
         <p:nvSpPr>
-          <p:cNvPr id="95" name="CustomShape 2"/>
+          <p:cNvPr id="96" name="CustomShape 2"/>
           <p:cNvSpPr/>
           <p:nvPr/>
         </p:nvSpPr>
         <p:spPr>
           <a:xfrm>
-            <a:off x="731520" y="1667520"/>
-            <a:ext cx="3910680" cy="912960"/>
+            <a:off x="365760" y="1667520"/>
+            <a:ext cx="8321040" cy="3107160"/>
           </a:xfrm>
           <a:prstGeom prst="rect">
             <a:avLst/>
@@ -6619,8 +6695,183 @@
                 <a:latin typeface="Calibri"/>
                 <a:ea typeface="DejaVu Sans"/>
               </a:rPr>
-              <a:t> </a:t>
-            </a:r>
+              <a:t>Research what others had done to solve the same problem and study their models.</a:t>
+            </a:r>
+            <a:endParaRPr b="0" lang="en-US" sz="1800" spc="-1" strike="noStrike">
+              <a:latin typeface="Arial"/>
+            </a:endParaRPr>
+          </a:p>
+          <a:p>
+            <a:pPr marL="285840" indent="-285120">
+              <a:lnSpc>
+                <a:spcPct val="100000"/>
+              </a:lnSpc>
+              <a:buClr>
+                <a:srgbClr val="17375e"/>
+              </a:buClr>
+              <a:buFont typeface="Arial"/>
+              <a:buChar char="•"/>
+            </a:pPr>
+            <a:endParaRPr b="0" lang="en-US" sz="1800" spc="-1" strike="noStrike">
+              <a:latin typeface="Arial"/>
+            </a:endParaRPr>
+          </a:p>
+          <a:p>
+            <a:pPr marL="285840" indent="-285120">
+              <a:lnSpc>
+                <a:spcPct val="100000"/>
+              </a:lnSpc>
+              <a:buClr>
+                <a:srgbClr val="17375e"/>
+              </a:buClr>
+              <a:buFont typeface="Arial"/>
+              <a:buChar char="•"/>
+            </a:pPr>
+            <a:r>
+              <a:rPr b="0" lang="en-US" sz="1800" spc="-1" strike="noStrike">
+                <a:solidFill>
+                  <a:srgbClr val="17375e"/>
+                </a:solidFill>
+                <a:latin typeface="Calibri"/>
+                <a:ea typeface="DejaVu Sans"/>
+              </a:rPr>
+              <a:t>Create and Experiment with various Models to determine what path to follow.</a:t>
+            </a:r>
+            <a:endParaRPr b="0" lang="en-US" sz="1800" spc="-1" strike="noStrike">
+              <a:latin typeface="Arial"/>
+            </a:endParaRPr>
+          </a:p>
+          <a:p>
+            <a:pPr lvl="1" marL="432000" indent="-216000">
+              <a:lnSpc>
+                <a:spcPct val="100000"/>
+              </a:lnSpc>
+              <a:buClr>
+                <a:srgbClr val="000000"/>
+              </a:buClr>
+              <a:buSzPct val="45000"/>
+              <a:buFont typeface="Wingdings" charset="2"/>
+              <a:buChar char=""/>
+            </a:pPr>
+            <a:r>
+              <a:rPr b="0" lang="en-US" sz="1800" spc="-1" strike="noStrike">
+                <a:solidFill>
+                  <a:srgbClr val="17375e"/>
+                </a:solidFill>
+                <a:latin typeface="Calibri"/>
+                <a:ea typeface="DejaVu Sans"/>
+              </a:rPr>
+              <a:t>One model with 3 branches, one for age, ethnicity, and gender each.</a:t>
+            </a:r>
+            <a:endParaRPr b="0" lang="en-US" sz="1800" spc="-1" strike="noStrike">
+              <a:latin typeface="Arial"/>
+            </a:endParaRPr>
+          </a:p>
+          <a:p>
+            <a:pPr lvl="1" marL="432000" indent="-216000">
+              <a:lnSpc>
+                <a:spcPct val="100000"/>
+              </a:lnSpc>
+              <a:buClr>
+                <a:srgbClr val="000000"/>
+              </a:buClr>
+              <a:buSzPct val="45000"/>
+              <a:buFont typeface="Wingdings" charset="2"/>
+              <a:buChar char=""/>
+            </a:pPr>
+            <a:r>
+              <a:rPr b="0" lang="en-US" sz="1800" spc="-1" strike="noStrike">
+                <a:solidFill>
+                  <a:srgbClr val="17375e"/>
+                </a:solidFill>
+                <a:latin typeface="Calibri"/>
+                <a:ea typeface="DejaVu Sans"/>
+              </a:rPr>
+              <a:t>Merge parameters into single parameter, creating single branch model.</a:t>
+            </a:r>
+            <a:endParaRPr b="0" lang="en-US" sz="1800" spc="-1" strike="noStrike">
+              <a:latin typeface="Arial"/>
+            </a:endParaRPr>
+          </a:p>
+          <a:p>
+            <a:pPr lvl="1" marL="432000" indent="-216000">
+              <a:lnSpc>
+                <a:spcPct val="100000"/>
+              </a:lnSpc>
+              <a:buClr>
+                <a:srgbClr val="000000"/>
+              </a:buClr>
+              <a:buSzPct val="45000"/>
+              <a:buFont typeface="Wingdings" charset="2"/>
+              <a:buChar char=""/>
+            </a:pPr>
+            <a:r>
+              <a:rPr b="0" lang="en-US" sz="1800" spc="-1" strike="noStrike">
+                <a:solidFill>
+                  <a:srgbClr val="17375e"/>
+                </a:solidFill>
+                <a:latin typeface="Calibri"/>
+                <a:ea typeface="DejaVu Sans"/>
+              </a:rPr>
+              <a:t>We settled on One mode with 3 branches.</a:t>
+            </a:r>
+            <a:endParaRPr b="0" lang="en-US" sz="1800" spc="-1" strike="noStrike">
+              <a:latin typeface="Arial"/>
+            </a:endParaRPr>
+          </a:p>
+          <a:p>
+            <a:pPr lvl="1" marL="432000" indent="-216000">
+              <a:lnSpc>
+                <a:spcPct val="100000"/>
+              </a:lnSpc>
+              <a:buClr>
+                <a:srgbClr val="000000"/>
+              </a:buClr>
+              <a:buSzPct val="45000"/>
+              <a:buFont typeface="Wingdings" charset="2"/>
+              <a:buChar char=""/>
+            </a:pPr>
+            <a:endParaRPr b="0" lang="en-US" sz="1800" spc="-1" strike="noStrike">
+              <a:latin typeface="Arial"/>
+            </a:endParaRPr>
+          </a:p>
+          <a:p>
+            <a:pPr marL="285840" indent="-285120">
+              <a:lnSpc>
+                <a:spcPct val="100000"/>
+              </a:lnSpc>
+              <a:buClr>
+                <a:srgbClr val="17375e"/>
+              </a:buClr>
+              <a:buFont typeface="Arial"/>
+              <a:buChar char="•"/>
+            </a:pPr>
+            <a:r>
+              <a:rPr b="0" lang="en-US" sz="1800" spc="-1" strike="noStrike">
+                <a:solidFill>
+                  <a:srgbClr val="17375e"/>
+                </a:solidFill>
+                <a:latin typeface="Calibri"/>
+                <a:ea typeface="DejaVu Sans"/>
+              </a:rPr>
+              <a:t>TBD</a:t>
+            </a:r>
+            <a:endParaRPr b="0" lang="en-US" sz="1800" spc="-1" strike="noStrike">
+              <a:latin typeface="Arial"/>
+            </a:endParaRPr>
+          </a:p>
+          <a:p>
+            <a:pPr lvl="1" marL="432000" indent="-216000">
+              <a:lnSpc>
+                <a:spcPct val="100000"/>
+              </a:lnSpc>
+              <a:buClr>
+                <a:srgbClr val="000000"/>
+              </a:buClr>
+              <a:buSzPct val="45000"/>
+              <a:buFont typeface="Wingdings" charset="2"/>
+              <a:buChar char=""/>
+            </a:pPr>
             <a:endParaRPr b="0" lang="en-US" sz="1800" spc="-1" strike="noStrike">
               <a:latin typeface="Arial"/>
             </a:endParaRPr>
@@ -6689,7 +6940,7 @@
       </p:grpSpPr>
       <p:sp>
         <p:nvSpPr>
-          <p:cNvPr id="96" name="CustomShape 1"/>
+          <p:cNvPr id="97" name="CustomShape 1"/>
           <p:cNvSpPr/>
           <p:nvPr/>
         </p:nvSpPr>
@@ -6740,7 +6991,7 @@
       </p:sp>
       <p:pic>
         <p:nvPicPr>
-          <p:cNvPr id="97" name="" descr=""/>
+          <p:cNvPr id="98" name="" descr=""/>
           <p:cNvPicPr/>
           <p:nvPr/>
         </p:nvPicPr>
@@ -6803,7 +7054,7 @@
       </p:grpSpPr>
       <p:sp>
         <p:nvSpPr>
-          <p:cNvPr id="98" name="CustomShape 1"/>
+          <p:cNvPr id="99" name="CustomShape 1"/>
           <p:cNvSpPr/>
           <p:nvPr/>
         </p:nvSpPr>
@@ -6854,7 +7105,7 @@
       </p:sp>
       <p:sp>
         <p:nvSpPr>
-          <p:cNvPr id="99" name="CustomShape 2"/>
+          <p:cNvPr id="100" name="CustomShape 2"/>
           <p:cNvSpPr/>
           <p:nvPr/>
         </p:nvSpPr>
@@ -6880,7 +7131,7 @@
       </p:sp>
       <p:sp>
         <p:nvSpPr>
-          <p:cNvPr id="100" name="CustomShape 3"/>
+          <p:cNvPr id="101" name="CustomShape 3"/>
           <p:cNvSpPr/>
           <p:nvPr/>
         </p:nvSpPr>

</xml_diff>